<commit_message>
Reestructuración de la Carpeta.
</commit_message>
<xml_diff>
--- a/Presentacion GELT - Gardella, Victoria (Data Engineer).pptx
+++ b/Presentacion GELT - Gardella, Victoria (Data Engineer).pptx
@@ -7,32 +7,38 @@
   <p:sldIdLst>
     <p:sldId id="256" r:id="rId2"/>
     <p:sldId id="257" r:id="rId3"/>
-    <p:sldId id="270" r:id="rId4"/>
-    <p:sldId id="258" r:id="rId5"/>
-    <p:sldId id="260" r:id="rId6"/>
-    <p:sldId id="263" r:id="rId7"/>
-    <p:sldId id="264" r:id="rId8"/>
-    <p:sldId id="265" r:id="rId9"/>
-    <p:sldId id="266" r:id="rId10"/>
-    <p:sldId id="267" r:id="rId11"/>
-    <p:sldId id="268" r:id="rId12"/>
-    <p:sldId id="269" r:id="rId13"/>
-    <p:sldId id="271" r:id="rId14"/>
-    <p:sldId id="272" r:id="rId15"/>
-    <p:sldId id="273" r:id="rId16"/>
-    <p:sldId id="275" r:id="rId17"/>
-    <p:sldId id="276" r:id="rId18"/>
-    <p:sldId id="277" r:id="rId19"/>
-    <p:sldId id="278" r:id="rId20"/>
-    <p:sldId id="279" r:id="rId21"/>
-    <p:sldId id="280" r:id="rId22"/>
-    <p:sldId id="281" r:id="rId23"/>
-    <p:sldId id="282" r:id="rId24"/>
-    <p:sldId id="283" r:id="rId25"/>
-    <p:sldId id="285" r:id="rId26"/>
-    <p:sldId id="286" r:id="rId27"/>
-    <p:sldId id="287" r:id="rId28"/>
-    <p:sldId id="288" r:id="rId29"/>
+    <p:sldId id="295" r:id="rId4"/>
+    <p:sldId id="270" r:id="rId5"/>
+    <p:sldId id="258" r:id="rId6"/>
+    <p:sldId id="260" r:id="rId7"/>
+    <p:sldId id="263" r:id="rId8"/>
+    <p:sldId id="264" r:id="rId9"/>
+    <p:sldId id="265" r:id="rId10"/>
+    <p:sldId id="266" r:id="rId11"/>
+    <p:sldId id="267" r:id="rId12"/>
+    <p:sldId id="268" r:id="rId13"/>
+    <p:sldId id="269" r:id="rId14"/>
+    <p:sldId id="271" r:id="rId15"/>
+    <p:sldId id="272" r:id="rId16"/>
+    <p:sldId id="273" r:id="rId17"/>
+    <p:sldId id="275" r:id="rId18"/>
+    <p:sldId id="276" r:id="rId19"/>
+    <p:sldId id="277" r:id="rId20"/>
+    <p:sldId id="278" r:id="rId21"/>
+    <p:sldId id="279" r:id="rId22"/>
+    <p:sldId id="280" r:id="rId23"/>
+    <p:sldId id="281" r:id="rId24"/>
+    <p:sldId id="282" r:id="rId25"/>
+    <p:sldId id="283" r:id="rId26"/>
+    <p:sldId id="285" r:id="rId27"/>
+    <p:sldId id="286" r:id="rId28"/>
+    <p:sldId id="287" r:id="rId29"/>
+    <p:sldId id="294" r:id="rId30"/>
+    <p:sldId id="289" r:id="rId31"/>
+    <p:sldId id="290" r:id="rId32"/>
+    <p:sldId id="291" r:id="rId33"/>
+    <p:sldId id="292" r:id="rId34"/>
+    <p:sldId id="293" r:id="rId35"/>
   </p:sldIdLst>
   <p:sldSz cx="12192000" cy="6858000"/>
   <p:notesSz cx="6858000" cy="9144000"/>
@@ -131,6 +137,11 @@
       </a:defRPr>
     </a:lvl9pPr>
   </p:defaultTextStyle>
+  <p:extLst>
+    <p:ext uri="{EFAFB233-063F-42B5-8137-9DF3F51BA10A}">
+      <p15:sldGuideLst xmlns:p15="http://schemas.microsoft.com/office/powerpoint/2012/main"/>
+    </p:ext>
+  </p:extLst>
 </p:presentation>
 </file>
 
@@ -302,7 +313,7 @@
           <a:p>
             <a:fld id="{48BF910B-2E6A-46EB-A28B-D5EAED4D6B30}" type="datetimeFigureOut">
               <a:rPr lang="es-ES" smtClean="0"/>
-              <a:t>29/08/2022</a:t>
+              <a:t>31/08/2022</a:t>
             </a:fld>
             <a:endParaRPr lang="es-ES"/>
           </a:p>
@@ -530,7 +541,7 @@
           <a:p>
             <a:fld id="{48BF910B-2E6A-46EB-A28B-D5EAED4D6B30}" type="datetimeFigureOut">
               <a:rPr lang="es-ES" smtClean="0"/>
-              <a:t>29/08/2022</a:t>
+              <a:t>31/08/2022</a:t>
             </a:fld>
             <a:endParaRPr lang="es-ES"/>
           </a:p>
@@ -710,7 +721,7 @@
           <a:p>
             <a:fld id="{48BF910B-2E6A-46EB-A28B-D5EAED4D6B30}" type="datetimeFigureOut">
               <a:rPr lang="es-ES" smtClean="0"/>
-              <a:t>29/08/2022</a:t>
+              <a:t>31/08/2022</a:t>
             </a:fld>
             <a:endParaRPr lang="es-ES"/>
           </a:p>
@@ -880,7 +891,7 @@
           <a:p>
             <a:fld id="{48BF910B-2E6A-46EB-A28B-D5EAED4D6B30}" type="datetimeFigureOut">
               <a:rPr lang="es-ES" smtClean="0"/>
-              <a:t>29/08/2022</a:t>
+              <a:t>31/08/2022</a:t>
             </a:fld>
             <a:endParaRPr lang="es-ES"/>
           </a:p>
@@ -1134,7 +1145,7 @@
           <a:p>
             <a:fld id="{48BF910B-2E6A-46EB-A28B-D5EAED4D6B30}" type="datetimeFigureOut">
               <a:rPr lang="es-ES" smtClean="0"/>
-              <a:t>29/08/2022</a:t>
+              <a:t>31/08/2022</a:t>
             </a:fld>
             <a:endParaRPr lang="es-ES"/>
           </a:p>
@@ -1460,7 +1471,7 @@
           <a:p>
             <a:fld id="{48BF910B-2E6A-46EB-A28B-D5EAED4D6B30}" type="datetimeFigureOut">
               <a:rPr lang="es-ES" smtClean="0"/>
-              <a:t>29/08/2022</a:t>
+              <a:t>31/08/2022</a:t>
             </a:fld>
             <a:endParaRPr lang="es-ES"/>
           </a:p>
@@ -1911,7 +1922,7 @@
           <a:p>
             <a:fld id="{48BF910B-2E6A-46EB-A28B-D5EAED4D6B30}" type="datetimeFigureOut">
               <a:rPr lang="es-ES" smtClean="0"/>
-              <a:t>29/08/2022</a:t>
+              <a:t>31/08/2022</a:t>
             </a:fld>
             <a:endParaRPr lang="es-ES"/>
           </a:p>
@@ -2029,7 +2040,7 @@
           <a:p>
             <a:fld id="{48BF910B-2E6A-46EB-A28B-D5EAED4D6B30}" type="datetimeFigureOut">
               <a:rPr lang="es-ES" smtClean="0"/>
-              <a:t>29/08/2022</a:t>
+              <a:t>31/08/2022</a:t>
             </a:fld>
             <a:endParaRPr lang="es-ES"/>
           </a:p>
@@ -2124,7 +2135,7 @@
           <a:p>
             <a:fld id="{48BF910B-2E6A-46EB-A28B-D5EAED4D6B30}" type="datetimeFigureOut">
               <a:rPr lang="es-ES" smtClean="0"/>
-              <a:t>29/08/2022</a:t>
+              <a:t>31/08/2022</a:t>
             </a:fld>
             <a:endParaRPr lang="es-ES"/>
           </a:p>
@@ -2411,7 +2422,7 @@
           <a:p>
             <a:fld id="{48BF910B-2E6A-46EB-A28B-D5EAED4D6B30}" type="datetimeFigureOut">
               <a:rPr lang="es-ES" smtClean="0"/>
-              <a:t>29/08/2022</a:t>
+              <a:t>31/08/2022</a:t>
             </a:fld>
             <a:endParaRPr lang="es-ES"/>
           </a:p>
@@ -2733,7 +2744,7 @@
           <a:p>
             <a:fld id="{48BF910B-2E6A-46EB-A28B-D5EAED4D6B30}" type="datetimeFigureOut">
               <a:rPr lang="es-ES" smtClean="0"/>
-              <a:t>29/08/2022</a:t>
+              <a:t>31/08/2022</a:t>
             </a:fld>
             <a:endParaRPr lang="es-ES"/>
           </a:p>
@@ -2987,7 +2998,7 @@
           <a:p>
             <a:fld id="{48BF910B-2E6A-46EB-A28B-D5EAED4D6B30}" type="datetimeFigureOut">
               <a:rPr lang="es-ES" smtClean="0"/>
-              <a:t>29/08/2022</a:t>
+              <a:t>31/08/2022</a:t>
             </a:fld>
             <a:endParaRPr lang="es-ES"/>
           </a:p>
@@ -3663,6 +3674,100 @@
           </a:prstGeom>
         </p:spPr>
       </p:pic>
+    </p:spTree>
+    <p:extLst>
+      <p:ext uri="{BB962C8B-B14F-4D97-AF65-F5344CB8AC3E}">
+        <p14:creationId xmlns:p14="http://schemas.microsoft.com/office/powerpoint/2010/main" val="2547857900"/>
+      </p:ext>
+    </p:extLst>
+  </p:cSld>
+  <p:clrMapOvr>
+    <a:masterClrMapping/>
+  </p:clrMapOvr>
+</p:sld>
+</file>
+
+<file path=ppt/slides/slide11.xml><?xml version="1.0" encoding="utf-8"?>
+<p:sld xmlns:a="http://schemas.openxmlformats.org/drawingml/2006/main" xmlns:r="http://schemas.openxmlformats.org/officeDocument/2006/relationships" xmlns:p="http://schemas.openxmlformats.org/presentationml/2006/main">
+  <p:cSld>
+    <p:spTree>
+      <p:nvGrpSpPr>
+        <p:cNvPr id="1" name=""/>
+        <p:cNvGrpSpPr/>
+        <p:nvPr/>
+      </p:nvGrpSpPr>
+      <p:grpSpPr>
+        <a:xfrm>
+          <a:off x="0" y="0"/>
+          <a:ext cx="0" cy="0"/>
+          <a:chOff x="0" y="0"/>
+          <a:chExt cx="0" cy="0"/>
+        </a:xfrm>
+      </p:grpSpPr>
+      <p:sp>
+        <p:nvSpPr>
+          <p:cNvPr id="2" name="Título 1">
+            <a:extLst>
+              <a:ext uri="{FF2B5EF4-FFF2-40B4-BE49-F238E27FC236}">
+                <a16:creationId xmlns:a16="http://schemas.microsoft.com/office/drawing/2014/main" id="{B1A12FDB-4206-B906-A1A8-1EE7C92A66E4}"/>
+              </a:ext>
+            </a:extLst>
+          </p:cNvPr>
+          <p:cNvSpPr>
+            <a:spLocks noGrp="1"/>
+          </p:cNvSpPr>
+          <p:nvPr>
+            <p:ph type="title"/>
+          </p:nvPr>
+        </p:nvSpPr>
+        <p:spPr/>
+        <p:txBody>
+          <a:bodyPr/>
+          <a:lstStyle/>
+          <a:p>
+            <a:r>
+              <a:rPr lang="es-ES" dirty="0"/>
+              <a:t>Modificación de los datos</a:t>
+            </a:r>
+          </a:p>
+        </p:txBody>
+      </p:sp>
+      <p:pic>
+        <p:nvPicPr>
+          <p:cNvPr id="7" name="Imagen 6" descr="Interfaz de usuario gráfica, Texto&#10;&#10;Descripción generada automáticamente">
+            <a:extLst>
+              <a:ext uri="{FF2B5EF4-FFF2-40B4-BE49-F238E27FC236}">
+                <a16:creationId xmlns:a16="http://schemas.microsoft.com/office/drawing/2014/main" id="{E50C4518-1A2A-4D61-BADC-D6E94BEDF49A}"/>
+              </a:ext>
+            </a:extLst>
+          </p:cNvPr>
+          <p:cNvPicPr>
+            <a:picLocks noChangeAspect="1"/>
+          </p:cNvPicPr>
+          <p:nvPr/>
+        </p:nvPicPr>
+        <p:blipFill>
+          <a:blip r:embed="rId2">
+            <a:extLst>
+              <a:ext uri="{28A0092B-C50C-407E-A947-70E740481C1C}">
+                <a14:useLocalDpi xmlns:a14="http://schemas.microsoft.com/office/drawing/2010/main" val="0"/>
+              </a:ext>
+            </a:extLst>
+          </a:blip>
+          <a:stretch>
+            <a:fillRect/>
+          </a:stretch>
+        </p:blipFill>
+        <p:spPr>
+          <a:xfrm>
+            <a:off x="670529" y="2148987"/>
+            <a:ext cx="10159311" cy="1553217"/>
+          </a:xfrm>
+          <a:prstGeom prst="rect">
+            <a:avLst/>
+          </a:prstGeom>
+        </p:spPr>
+      </p:pic>
       <p:pic>
         <p:nvPicPr>
           <p:cNvPr id="4" name="Imagen 3" descr="Imagen que contiene computadora&#10;&#10;Descripción generada automáticamente">
@@ -3712,7 +3817,7 @@
 </p:sld>
 </file>
 
-<file path=ppt/slides/slide11.xml><?xml version="1.0" encoding="utf-8"?>
+<file path=ppt/slides/slide12.xml><?xml version="1.0" encoding="utf-8"?>
 <p:sld xmlns:a="http://schemas.openxmlformats.org/drawingml/2006/main" xmlns:r="http://schemas.openxmlformats.org/officeDocument/2006/relationships" xmlns:p="http://schemas.openxmlformats.org/presentationml/2006/main">
   <p:cSld>
     <p:spTree>
@@ -3812,7 +3917,7 @@
 </p:sld>
 </file>
 
-<file path=ppt/slides/slide12.xml><?xml version="1.0" encoding="utf-8"?>
+<file path=ppt/slides/slide13.xml><?xml version="1.0" encoding="utf-8"?>
 <p:sld xmlns:a="http://schemas.openxmlformats.org/drawingml/2006/main" xmlns:r="http://schemas.openxmlformats.org/officeDocument/2006/relationships" xmlns:p="http://schemas.openxmlformats.org/presentationml/2006/main">
   <p:cSld>
     <p:spTree>
@@ -3964,7 +4069,7 @@
 </p:sld>
 </file>
 
-<file path=ppt/slides/slide13.xml><?xml version="1.0" encoding="utf-8"?>
+<file path=ppt/slides/slide14.xml><?xml version="1.0" encoding="utf-8"?>
 <p:sld xmlns:a="http://schemas.openxmlformats.org/drawingml/2006/main" xmlns:r="http://schemas.openxmlformats.org/officeDocument/2006/relationships" xmlns:p="http://schemas.openxmlformats.org/presentationml/2006/main">
   <p:cSld>
     <p:spTree>
@@ -4022,7 +4127,7 @@
 </p:sld>
 </file>
 
-<file path=ppt/slides/slide14.xml><?xml version="1.0" encoding="utf-8"?>
+<file path=ppt/slides/slide15.xml><?xml version="1.0" encoding="utf-8"?>
 <p:sld xmlns:a="http://schemas.openxmlformats.org/drawingml/2006/main" xmlns:r="http://schemas.openxmlformats.org/officeDocument/2006/relationships" xmlns:p="http://schemas.openxmlformats.org/presentationml/2006/main">
   <p:cSld>
     <p:spTree>
@@ -4487,7 +4592,7 @@
 </p:sld>
 </file>
 
-<file path=ppt/slides/slide15.xml><?xml version="1.0" encoding="utf-8"?>
+<file path=ppt/slides/slide16.xml><?xml version="1.0" encoding="utf-8"?>
 <p:sld xmlns:a="http://schemas.openxmlformats.org/drawingml/2006/main" xmlns:r="http://schemas.openxmlformats.org/officeDocument/2006/relationships" xmlns:p="http://schemas.openxmlformats.org/presentationml/2006/main">
   <p:cSld>
     <p:spTree>
@@ -4574,99 +4679,6 @@
 </p:sld>
 </file>
 
-<file path=ppt/slides/slide16.xml><?xml version="1.0" encoding="utf-8"?>
-<p:sld xmlns:a="http://schemas.openxmlformats.org/drawingml/2006/main" xmlns:r="http://schemas.openxmlformats.org/officeDocument/2006/relationships" xmlns:p="http://schemas.openxmlformats.org/presentationml/2006/main">
-  <p:cSld>
-    <p:spTree>
-      <p:nvGrpSpPr>
-        <p:cNvPr id="1" name=""/>
-        <p:cNvGrpSpPr/>
-        <p:nvPr/>
-      </p:nvGrpSpPr>
-      <p:grpSpPr>
-        <a:xfrm>
-          <a:off x="0" y="0"/>
-          <a:ext cx="0" cy="0"/>
-          <a:chOff x="0" y="0"/>
-          <a:chExt cx="0" cy="0"/>
-        </a:xfrm>
-      </p:grpSpPr>
-      <p:sp>
-        <p:nvSpPr>
-          <p:cNvPr id="2" name="Título 1">
-            <a:extLst>
-              <a:ext uri="{FF2B5EF4-FFF2-40B4-BE49-F238E27FC236}">
-                <a16:creationId xmlns:a16="http://schemas.microsoft.com/office/drawing/2014/main" id="{AB48FA38-8A73-0F76-E70B-9F77112D84CF}"/>
-              </a:ext>
-            </a:extLst>
-          </p:cNvPr>
-          <p:cNvSpPr>
-            <a:spLocks noGrp="1"/>
-          </p:cNvSpPr>
-          <p:nvPr>
-            <p:ph type="title"/>
-          </p:nvPr>
-        </p:nvSpPr>
-        <p:spPr/>
-        <p:txBody>
-          <a:bodyPr/>
-          <a:lstStyle/>
-          <a:p>
-            <a:r>
-              <a:rPr lang="es-ES" dirty="0"/>
-              <a:t>Diagrama entidad-relación</a:t>
-            </a:r>
-          </a:p>
-        </p:txBody>
-      </p:sp>
-      <p:pic>
-        <p:nvPicPr>
-          <p:cNvPr id="5" name="Marcador de contenido 4" descr="Diagrama&#10;&#10;Descripción generada automáticamente">
-            <a:extLst>
-              <a:ext uri="{FF2B5EF4-FFF2-40B4-BE49-F238E27FC236}">
-                <a16:creationId xmlns:a16="http://schemas.microsoft.com/office/drawing/2014/main" id="{567346B6-F039-BF87-3293-D7733DAB4664}"/>
-              </a:ext>
-            </a:extLst>
-          </p:cNvPr>
-          <p:cNvPicPr>
-            <a:picLocks noGrp="1" noChangeAspect="1"/>
-          </p:cNvPicPr>
-          <p:nvPr>
-            <p:ph idx="1"/>
-          </p:nvPr>
-        </p:nvPicPr>
-        <p:blipFill>
-          <a:blip r:embed="rId2">
-            <a:extLst>
-              <a:ext uri="{28A0092B-C50C-407E-A947-70E740481C1C}">
-                <a14:useLocalDpi xmlns:a14="http://schemas.microsoft.com/office/drawing/2010/main" val="0"/>
-              </a:ext>
-            </a:extLst>
-          </a:blip>
-          <a:stretch>
-            <a:fillRect/>
-          </a:stretch>
-        </p:blipFill>
-        <p:spPr>
-          <a:xfrm>
-            <a:off x="2386361" y="1691322"/>
-            <a:ext cx="6501161" cy="4828633"/>
-          </a:xfrm>
-        </p:spPr>
-      </p:pic>
-    </p:spTree>
-    <p:extLst>
-      <p:ext uri="{BB962C8B-B14F-4D97-AF65-F5344CB8AC3E}">
-        <p14:creationId xmlns:p14="http://schemas.microsoft.com/office/powerpoint/2010/main" val="2735591116"/>
-      </p:ext>
-    </p:extLst>
-  </p:cSld>
-  <p:clrMapOvr>
-    <a:masterClrMapping/>
-  </p:clrMapOvr>
-</p:sld>
-</file>
-
 <file path=ppt/slides/slide17.xml><?xml version="1.0" encoding="utf-8"?>
 <p:sld xmlns:a="http://schemas.openxmlformats.org/drawingml/2006/main" xmlns:r="http://schemas.openxmlformats.org/officeDocument/2006/relationships" xmlns:p="http://schemas.openxmlformats.org/presentationml/2006/main">
   <p:cSld>
@@ -4689,7 +4701,7 @@
           <p:cNvPr id="2" name="Título 1">
             <a:extLst>
               <a:ext uri="{FF2B5EF4-FFF2-40B4-BE49-F238E27FC236}">
-                <a16:creationId xmlns:a16="http://schemas.microsoft.com/office/drawing/2014/main" id="{E042DA18-D6B4-3E76-8E7E-546639D2F6FD}"/>
+                <a16:creationId xmlns:a16="http://schemas.microsoft.com/office/drawing/2014/main" id="{AB48FA38-8A73-0F76-E70B-9F77112D84CF}"/>
               </a:ext>
             </a:extLst>
           </p:cNvPr>
@@ -4707,40 +4719,50 @@
           <a:p>
             <a:r>
               <a:rPr lang="es-ES" dirty="0"/>
-              <a:t>Carga de datos</a:t>
-            </a:r>
-          </a:p>
-        </p:txBody>
-      </p:sp>
-      <p:sp>
-        <p:nvSpPr>
-          <p:cNvPr id="3" name="Marcador de texto 2">
-            <a:extLst>
-              <a:ext uri="{FF2B5EF4-FFF2-40B4-BE49-F238E27FC236}">
-                <a16:creationId xmlns:a16="http://schemas.microsoft.com/office/drawing/2014/main" id="{8C54FA19-8ACD-3968-4FA3-36DF7FCB7D30}"/>
-              </a:ext>
-            </a:extLst>
-          </p:cNvPr>
-          <p:cNvSpPr>
-            <a:spLocks noGrp="1"/>
-          </p:cNvSpPr>
-          <p:nvPr>
-            <p:ph type="body" idx="1"/>
-          </p:nvPr>
-        </p:nvSpPr>
-        <p:spPr/>
-        <p:txBody>
-          <a:bodyPr/>
-          <a:lstStyle/>
-          <a:p>
-            <a:endParaRPr lang="es-ES"/>
-          </a:p>
-        </p:txBody>
-      </p:sp>
+              <a:t>Diagrama entidad-relación</a:t>
+            </a:r>
+          </a:p>
+        </p:txBody>
+      </p:sp>
+      <p:pic>
+        <p:nvPicPr>
+          <p:cNvPr id="5" name="Marcador de contenido 4" descr="Diagrama&#10;&#10;Descripción generada automáticamente">
+            <a:extLst>
+              <a:ext uri="{FF2B5EF4-FFF2-40B4-BE49-F238E27FC236}">
+                <a16:creationId xmlns:a16="http://schemas.microsoft.com/office/drawing/2014/main" id="{567346B6-F039-BF87-3293-D7733DAB4664}"/>
+              </a:ext>
+            </a:extLst>
+          </p:cNvPr>
+          <p:cNvPicPr>
+            <a:picLocks noGrp="1" noChangeAspect="1"/>
+          </p:cNvPicPr>
+          <p:nvPr>
+            <p:ph idx="1"/>
+          </p:nvPr>
+        </p:nvPicPr>
+        <p:blipFill>
+          <a:blip r:embed="rId2">
+            <a:extLst>
+              <a:ext uri="{28A0092B-C50C-407E-A947-70E740481C1C}">
+                <a14:useLocalDpi xmlns:a14="http://schemas.microsoft.com/office/drawing/2010/main" val="0"/>
+              </a:ext>
+            </a:extLst>
+          </a:blip>
+          <a:stretch>
+            <a:fillRect/>
+          </a:stretch>
+        </p:blipFill>
+        <p:spPr>
+          <a:xfrm>
+            <a:off x="2386361" y="1691322"/>
+            <a:ext cx="6501161" cy="4828633"/>
+          </a:xfrm>
+        </p:spPr>
+      </p:pic>
     </p:spTree>
     <p:extLst>
       <p:ext uri="{BB962C8B-B14F-4D97-AF65-F5344CB8AC3E}">
-        <p14:creationId xmlns:p14="http://schemas.microsoft.com/office/powerpoint/2010/main" val="824843822"/>
+        <p14:creationId xmlns:p14="http://schemas.microsoft.com/office/powerpoint/2010/main" val="2735591116"/>
       </p:ext>
     </p:extLst>
   </p:cSld>
@@ -4772,6 +4794,89 @@
           <p:cNvPr id="2" name="Título 1">
             <a:extLst>
               <a:ext uri="{FF2B5EF4-FFF2-40B4-BE49-F238E27FC236}">
+                <a16:creationId xmlns:a16="http://schemas.microsoft.com/office/drawing/2014/main" id="{E042DA18-D6B4-3E76-8E7E-546639D2F6FD}"/>
+              </a:ext>
+            </a:extLst>
+          </p:cNvPr>
+          <p:cNvSpPr>
+            <a:spLocks noGrp="1"/>
+          </p:cNvSpPr>
+          <p:nvPr>
+            <p:ph type="title"/>
+          </p:nvPr>
+        </p:nvSpPr>
+        <p:spPr/>
+        <p:txBody>
+          <a:bodyPr/>
+          <a:lstStyle/>
+          <a:p>
+            <a:r>
+              <a:rPr lang="es-ES" dirty="0"/>
+              <a:t>Carga de datos</a:t>
+            </a:r>
+          </a:p>
+        </p:txBody>
+      </p:sp>
+      <p:sp>
+        <p:nvSpPr>
+          <p:cNvPr id="3" name="Marcador de texto 2">
+            <a:extLst>
+              <a:ext uri="{FF2B5EF4-FFF2-40B4-BE49-F238E27FC236}">
+                <a16:creationId xmlns:a16="http://schemas.microsoft.com/office/drawing/2014/main" id="{8C54FA19-8ACD-3968-4FA3-36DF7FCB7D30}"/>
+              </a:ext>
+            </a:extLst>
+          </p:cNvPr>
+          <p:cNvSpPr>
+            <a:spLocks noGrp="1"/>
+          </p:cNvSpPr>
+          <p:nvPr>
+            <p:ph type="body" idx="1"/>
+          </p:nvPr>
+        </p:nvSpPr>
+        <p:spPr/>
+        <p:txBody>
+          <a:bodyPr/>
+          <a:lstStyle/>
+          <a:p>
+            <a:endParaRPr lang="es-ES"/>
+          </a:p>
+        </p:txBody>
+      </p:sp>
+    </p:spTree>
+    <p:extLst>
+      <p:ext uri="{BB962C8B-B14F-4D97-AF65-F5344CB8AC3E}">
+        <p14:creationId xmlns:p14="http://schemas.microsoft.com/office/powerpoint/2010/main" val="824843822"/>
+      </p:ext>
+    </p:extLst>
+  </p:cSld>
+  <p:clrMapOvr>
+    <a:masterClrMapping/>
+  </p:clrMapOvr>
+</p:sld>
+</file>
+
+<file path=ppt/slides/slide19.xml><?xml version="1.0" encoding="utf-8"?>
+<p:sld xmlns:a="http://schemas.openxmlformats.org/drawingml/2006/main" xmlns:r="http://schemas.openxmlformats.org/officeDocument/2006/relationships" xmlns:p="http://schemas.openxmlformats.org/presentationml/2006/main">
+  <p:cSld>
+    <p:spTree>
+      <p:nvGrpSpPr>
+        <p:cNvPr id="1" name=""/>
+        <p:cNvGrpSpPr/>
+        <p:nvPr/>
+      </p:nvGrpSpPr>
+      <p:grpSpPr>
+        <a:xfrm>
+          <a:off x="0" y="0"/>
+          <a:ext cx="0" cy="0"/>
+          <a:chOff x="0" y="0"/>
+          <a:chExt cx="0" cy="0"/>
+        </a:xfrm>
+      </p:grpSpPr>
+      <p:sp>
+        <p:nvSpPr>
+          <p:cNvPr id="2" name="Título 1">
+            <a:extLst>
+              <a:ext uri="{FF2B5EF4-FFF2-40B4-BE49-F238E27FC236}">
                 <a16:creationId xmlns:a16="http://schemas.microsoft.com/office/drawing/2014/main" id="{8BD0B3B3-A471-8F47-31DD-0B44DE05B624}"/>
               </a:ext>
             </a:extLst>
@@ -4888,147 +4993,6 @@
     <p:extLst>
       <p:ext uri="{BB962C8B-B14F-4D97-AF65-F5344CB8AC3E}">
         <p14:creationId xmlns:p14="http://schemas.microsoft.com/office/powerpoint/2010/main" val="2677088901"/>
-      </p:ext>
-    </p:extLst>
-  </p:cSld>
-  <p:clrMapOvr>
-    <a:masterClrMapping/>
-  </p:clrMapOvr>
-</p:sld>
-</file>
-
-<file path=ppt/slides/slide19.xml><?xml version="1.0" encoding="utf-8"?>
-<p:sld xmlns:a="http://schemas.openxmlformats.org/drawingml/2006/main" xmlns:r="http://schemas.openxmlformats.org/officeDocument/2006/relationships" xmlns:p="http://schemas.openxmlformats.org/presentationml/2006/main">
-  <p:cSld>
-    <p:bg>
-      <p:bgPr>
-        <a:solidFill>
-          <a:schemeClr val="bg1"/>
-        </a:solidFill>
-        <a:effectLst/>
-      </p:bgPr>
-    </p:bg>
-    <p:spTree>
-      <p:nvGrpSpPr>
-        <p:cNvPr id="1" name=""/>
-        <p:cNvGrpSpPr/>
-        <p:nvPr/>
-      </p:nvGrpSpPr>
-      <p:grpSpPr>
-        <a:xfrm>
-          <a:off x="0" y="0"/>
-          <a:ext cx="0" cy="0"/>
-          <a:chOff x="0" y="0"/>
-          <a:chExt cx="0" cy="0"/>
-        </a:xfrm>
-      </p:grpSpPr>
-      <p:sp>
-        <p:nvSpPr>
-          <p:cNvPr id="2" name="Título 1">
-            <a:extLst>
-              <a:ext uri="{FF2B5EF4-FFF2-40B4-BE49-F238E27FC236}">
-                <a16:creationId xmlns:a16="http://schemas.microsoft.com/office/drawing/2014/main" id="{282D66F3-ADE9-84B3-B3C9-598590007B5C}"/>
-              </a:ext>
-            </a:extLst>
-          </p:cNvPr>
-          <p:cNvSpPr>
-            <a:spLocks noGrp="1"/>
-          </p:cNvSpPr>
-          <p:nvPr>
-            <p:ph type="title"/>
-          </p:nvPr>
-        </p:nvSpPr>
-        <p:spPr>
-          <a:xfrm>
-            <a:off x="718874" y="677863"/>
-            <a:ext cx="4534047" cy="1325562"/>
-          </a:xfrm>
-        </p:spPr>
-        <p:txBody>
-          <a:bodyPr>
-            <a:normAutofit/>
-          </a:bodyPr>
-          <a:lstStyle/>
-          <a:p>
-            <a:r>
-              <a:rPr lang="es-ES" dirty="0"/>
-              <a:t>Ingreso de datos</a:t>
-            </a:r>
-          </a:p>
-        </p:txBody>
-      </p:sp>
-      <p:sp>
-        <p:nvSpPr>
-          <p:cNvPr id="13" name="Content Placeholder 10">
-            <a:extLst>
-              <a:ext uri="{FF2B5EF4-FFF2-40B4-BE49-F238E27FC236}">
-                <a16:creationId xmlns:a16="http://schemas.microsoft.com/office/drawing/2014/main" id="{F930DA01-F2FE-2559-439A-69B3E2F10EF2}"/>
-              </a:ext>
-            </a:extLst>
-          </p:cNvPr>
-          <p:cNvSpPr>
-            <a:spLocks noGrp="1"/>
-          </p:cNvSpPr>
-          <p:nvPr>
-            <p:ph idx="1"/>
-          </p:nvPr>
-        </p:nvSpPr>
-        <p:spPr>
-          <a:xfrm>
-            <a:off x="718874" y="2325158"/>
-            <a:ext cx="4534048" cy="3854979"/>
-          </a:xfrm>
-        </p:spPr>
-        <p:txBody>
-          <a:bodyPr>
-            <a:normAutofit/>
-          </a:bodyPr>
-          <a:lstStyle/>
-          <a:p>
-            <a:endParaRPr lang="en-US" dirty="0"/>
-          </a:p>
-        </p:txBody>
-      </p:sp>
-      <p:pic>
-        <p:nvPicPr>
-          <p:cNvPr id="7" name="Marcador de contenido 6" descr="Texto&#10;&#10;Descripción generada automáticamente">
-            <a:extLst>
-              <a:ext uri="{FF2B5EF4-FFF2-40B4-BE49-F238E27FC236}">
-                <a16:creationId xmlns:a16="http://schemas.microsoft.com/office/drawing/2014/main" id="{3501A1D8-A870-B181-7BF7-408C3AEFFF03}"/>
-              </a:ext>
-            </a:extLst>
-          </p:cNvPr>
-          <p:cNvPicPr>
-            <a:picLocks noChangeAspect="1"/>
-          </p:cNvPicPr>
-          <p:nvPr/>
-        </p:nvPicPr>
-        <p:blipFill>
-          <a:blip r:embed="rId2">
-            <a:extLst>
-              <a:ext uri="{28A0092B-C50C-407E-A947-70E740481C1C}">
-                <a14:useLocalDpi xmlns:a14="http://schemas.microsoft.com/office/drawing/2010/main" val="0"/>
-              </a:ext>
-            </a:extLst>
-          </a:blip>
-          <a:stretch>
-            <a:fillRect/>
-          </a:stretch>
-        </p:blipFill>
-        <p:spPr>
-          <a:xfrm>
-            <a:off x="6017219" y="661484"/>
-            <a:ext cx="4441864" cy="5535031"/>
-          </a:xfrm>
-          <a:prstGeom prst="rect">
-            <a:avLst/>
-          </a:prstGeom>
-        </p:spPr>
-      </p:pic>
-    </p:spTree>
-    <p:extLst>
-      <p:ext uri="{BB962C8B-B14F-4D97-AF65-F5344CB8AC3E}">
-        <p14:creationId xmlns:p14="http://schemas.microsoft.com/office/powerpoint/2010/main" val="1000436341"/>
       </p:ext>
     </p:extLst>
   </p:cSld>
@@ -5250,6 +5214,147 @@
           </a:bodyPr>
           <a:lstStyle/>
           <a:p>
+            <a:endParaRPr lang="en-US" dirty="0"/>
+          </a:p>
+        </p:txBody>
+      </p:sp>
+      <p:pic>
+        <p:nvPicPr>
+          <p:cNvPr id="7" name="Marcador de contenido 6" descr="Texto&#10;&#10;Descripción generada automáticamente">
+            <a:extLst>
+              <a:ext uri="{FF2B5EF4-FFF2-40B4-BE49-F238E27FC236}">
+                <a16:creationId xmlns:a16="http://schemas.microsoft.com/office/drawing/2014/main" id="{3501A1D8-A870-B181-7BF7-408C3AEFFF03}"/>
+              </a:ext>
+            </a:extLst>
+          </p:cNvPr>
+          <p:cNvPicPr>
+            <a:picLocks noChangeAspect="1"/>
+          </p:cNvPicPr>
+          <p:nvPr/>
+        </p:nvPicPr>
+        <p:blipFill>
+          <a:blip r:embed="rId2">
+            <a:extLst>
+              <a:ext uri="{28A0092B-C50C-407E-A947-70E740481C1C}">
+                <a14:useLocalDpi xmlns:a14="http://schemas.microsoft.com/office/drawing/2010/main" val="0"/>
+              </a:ext>
+            </a:extLst>
+          </a:blip>
+          <a:stretch>
+            <a:fillRect/>
+          </a:stretch>
+        </p:blipFill>
+        <p:spPr>
+          <a:xfrm>
+            <a:off x="6017219" y="661484"/>
+            <a:ext cx="4441864" cy="5535031"/>
+          </a:xfrm>
+          <a:prstGeom prst="rect">
+            <a:avLst/>
+          </a:prstGeom>
+        </p:spPr>
+      </p:pic>
+    </p:spTree>
+    <p:extLst>
+      <p:ext uri="{BB962C8B-B14F-4D97-AF65-F5344CB8AC3E}">
+        <p14:creationId xmlns:p14="http://schemas.microsoft.com/office/powerpoint/2010/main" val="1000436341"/>
+      </p:ext>
+    </p:extLst>
+  </p:cSld>
+  <p:clrMapOvr>
+    <a:masterClrMapping/>
+  </p:clrMapOvr>
+</p:sld>
+</file>
+
+<file path=ppt/slides/slide21.xml><?xml version="1.0" encoding="utf-8"?>
+<p:sld xmlns:a="http://schemas.openxmlformats.org/drawingml/2006/main" xmlns:r="http://schemas.openxmlformats.org/officeDocument/2006/relationships" xmlns:p="http://schemas.openxmlformats.org/presentationml/2006/main">
+  <p:cSld>
+    <p:bg>
+      <p:bgPr>
+        <a:solidFill>
+          <a:schemeClr val="bg1"/>
+        </a:solidFill>
+        <a:effectLst/>
+      </p:bgPr>
+    </p:bg>
+    <p:spTree>
+      <p:nvGrpSpPr>
+        <p:cNvPr id="1" name=""/>
+        <p:cNvGrpSpPr/>
+        <p:nvPr/>
+      </p:nvGrpSpPr>
+      <p:grpSpPr>
+        <a:xfrm>
+          <a:off x="0" y="0"/>
+          <a:ext cx="0" cy="0"/>
+          <a:chOff x="0" y="0"/>
+          <a:chExt cx="0" cy="0"/>
+        </a:xfrm>
+      </p:grpSpPr>
+      <p:sp>
+        <p:nvSpPr>
+          <p:cNvPr id="2" name="Título 1">
+            <a:extLst>
+              <a:ext uri="{FF2B5EF4-FFF2-40B4-BE49-F238E27FC236}">
+                <a16:creationId xmlns:a16="http://schemas.microsoft.com/office/drawing/2014/main" id="{282D66F3-ADE9-84B3-B3C9-598590007B5C}"/>
+              </a:ext>
+            </a:extLst>
+          </p:cNvPr>
+          <p:cNvSpPr>
+            <a:spLocks noGrp="1"/>
+          </p:cNvSpPr>
+          <p:nvPr>
+            <p:ph type="title"/>
+          </p:nvPr>
+        </p:nvSpPr>
+        <p:spPr>
+          <a:xfrm>
+            <a:off x="718874" y="677863"/>
+            <a:ext cx="4534047" cy="1325562"/>
+          </a:xfrm>
+        </p:spPr>
+        <p:txBody>
+          <a:bodyPr>
+            <a:normAutofit/>
+          </a:bodyPr>
+          <a:lstStyle/>
+          <a:p>
+            <a:r>
+              <a:rPr lang="es-ES" dirty="0"/>
+              <a:t>Ingreso de datos</a:t>
+            </a:r>
+          </a:p>
+        </p:txBody>
+      </p:sp>
+      <p:sp>
+        <p:nvSpPr>
+          <p:cNvPr id="13" name="Content Placeholder 10">
+            <a:extLst>
+              <a:ext uri="{FF2B5EF4-FFF2-40B4-BE49-F238E27FC236}">
+                <a16:creationId xmlns:a16="http://schemas.microsoft.com/office/drawing/2014/main" id="{F930DA01-F2FE-2559-439A-69B3E2F10EF2}"/>
+              </a:ext>
+            </a:extLst>
+          </p:cNvPr>
+          <p:cNvSpPr>
+            <a:spLocks noGrp="1"/>
+          </p:cNvSpPr>
+          <p:nvPr>
+            <p:ph idx="1"/>
+          </p:nvPr>
+        </p:nvSpPr>
+        <p:spPr>
+          <a:xfrm>
+            <a:off x="718874" y="2325158"/>
+            <a:ext cx="4534048" cy="3854979"/>
+          </a:xfrm>
+        </p:spPr>
+        <p:txBody>
+          <a:bodyPr>
+            <a:normAutofit/>
+          </a:bodyPr>
+          <a:lstStyle/>
+          <a:p>
             <a:r>
               <a:rPr lang="en-US" dirty="0"/>
               <a:t>4 </a:t>
@@ -5366,7 +5471,7 @@
 </p:sld>
 </file>
 
-<file path=ppt/slides/slide21.xml><?xml version="1.0" encoding="utf-8"?>
+<file path=ppt/slides/slide22.xml><?xml version="1.0" encoding="utf-8"?>
 <p:sld xmlns:a="http://schemas.openxmlformats.org/drawingml/2006/main" xmlns:r="http://schemas.openxmlformats.org/officeDocument/2006/relationships" xmlns:p="http://schemas.openxmlformats.org/presentationml/2006/main">
   <p:cSld>
     <p:spTree>
@@ -5740,7 +5845,7 @@
 </p:sld>
 </file>
 
-<file path=ppt/slides/slide22.xml><?xml version="1.0" encoding="utf-8"?>
+<file path=ppt/slides/slide23.xml><?xml version="1.0" encoding="utf-8"?>
 <p:sld xmlns:a="http://schemas.openxmlformats.org/drawingml/2006/main" xmlns:r="http://schemas.openxmlformats.org/officeDocument/2006/relationships" xmlns:p="http://schemas.openxmlformats.org/presentationml/2006/main">
   <p:cSld>
     <p:spTree>
@@ -5789,206 +5894,6 @@
     <p:extLst>
       <p:ext uri="{BB962C8B-B14F-4D97-AF65-F5344CB8AC3E}">
         <p14:creationId xmlns:p14="http://schemas.microsoft.com/office/powerpoint/2010/main" val="4286407022"/>
-      </p:ext>
-    </p:extLst>
-  </p:cSld>
-  <p:clrMapOvr>
-    <a:masterClrMapping/>
-  </p:clrMapOvr>
-</p:sld>
-</file>
-
-<file path=ppt/slides/slide23.xml><?xml version="1.0" encoding="utf-8"?>
-<p:sld xmlns:a="http://schemas.openxmlformats.org/drawingml/2006/main" xmlns:r="http://schemas.openxmlformats.org/officeDocument/2006/relationships" xmlns:p="http://schemas.openxmlformats.org/presentationml/2006/main">
-  <p:cSld>
-    <p:bg>
-      <p:bgPr>
-        <a:solidFill>
-          <a:schemeClr val="bg1"/>
-        </a:solidFill>
-        <a:effectLst/>
-      </p:bgPr>
-    </p:bg>
-    <p:spTree>
-      <p:nvGrpSpPr>
-        <p:cNvPr id="1" name=""/>
-        <p:cNvGrpSpPr/>
-        <p:nvPr/>
-      </p:nvGrpSpPr>
-      <p:grpSpPr>
-        <a:xfrm>
-          <a:off x="0" y="0"/>
-          <a:ext cx="0" cy="0"/>
-          <a:chOff x="0" y="0"/>
-          <a:chExt cx="0" cy="0"/>
-        </a:xfrm>
-      </p:grpSpPr>
-      <p:sp>
-        <p:nvSpPr>
-          <p:cNvPr id="12" name="Rectangle 11">
-            <a:extLst>
-              <a:ext uri="{FF2B5EF4-FFF2-40B4-BE49-F238E27FC236}">
-                <a16:creationId xmlns:a16="http://schemas.microsoft.com/office/drawing/2014/main" id="{6FA0A1AD-DEE2-4598-8D3B-C1F65F315A79}"/>
-              </a:ext>
-              <a:ext uri="{C183D7F6-B498-43B3-948B-1728B52AA6E4}">
-                <adec:decorative xmlns:adec="http://schemas.microsoft.com/office/drawing/2017/decorative" val="1"/>
-              </a:ext>
-            </a:extLst>
-          </p:cNvPr>
-          <p:cNvSpPr>
-            <a:spLocks noGrp="1" noRot="1" noChangeAspect="1" noMove="1" noResize="1" noEditPoints="1" noAdjustHandles="1" noChangeArrowheads="1" noChangeShapeType="1" noTextEdit="1"/>
-          </p:cNvSpPr>
-          <p:nvPr>
-            <p:extLst>
-              <p:ext uri="{386F3935-93C4-4BCD-93E2-E3B085C9AB24}">
-                <p16:designElem xmlns:p16="http://schemas.microsoft.com/office/powerpoint/2015/main" val="1"/>
-              </p:ext>
-            </p:extLst>
-          </p:nvPr>
-        </p:nvSpPr>
-        <p:spPr>
-          <a:xfrm>
-            <a:off x="11292840" y="0"/>
-            <a:ext cx="914400" cy="6858000"/>
-          </a:xfrm>
-          <a:prstGeom prst="rect">
-            <a:avLst/>
-          </a:prstGeom>
-          <a:solidFill>
-            <a:schemeClr val="tx2">
-              <a:lumMod val="75000"/>
-            </a:schemeClr>
-          </a:solidFill>
-          <a:ln>
-            <a:noFill/>
-          </a:ln>
-        </p:spPr>
-        <p:style>
-          <a:lnRef idx="2">
-            <a:schemeClr val="accent1">
-              <a:shade val="50000"/>
-            </a:schemeClr>
-          </a:lnRef>
-          <a:fillRef idx="1">
-            <a:schemeClr val="accent1"/>
-          </a:fillRef>
-          <a:effectRef idx="0">
-            <a:schemeClr val="accent1"/>
-          </a:effectRef>
-          <a:fontRef idx="minor">
-            <a:schemeClr val="lt1"/>
-          </a:fontRef>
-        </p:style>
-      </p:sp>
-      <p:sp>
-        <p:nvSpPr>
-          <p:cNvPr id="2" name="Título 1">
-            <a:extLst>
-              <a:ext uri="{FF2B5EF4-FFF2-40B4-BE49-F238E27FC236}">
-                <a16:creationId xmlns:a16="http://schemas.microsoft.com/office/drawing/2014/main" id="{10B6794C-5B34-27A6-F897-2FE976E8589E}"/>
-              </a:ext>
-            </a:extLst>
-          </p:cNvPr>
-          <p:cNvSpPr>
-            <a:spLocks noGrp="1"/>
-          </p:cNvSpPr>
-          <p:nvPr>
-            <p:ph type="title"/>
-          </p:nvPr>
-        </p:nvSpPr>
-        <p:spPr>
-          <a:xfrm>
-            <a:off x="718874" y="677863"/>
-            <a:ext cx="4534047" cy="1325562"/>
-          </a:xfrm>
-        </p:spPr>
-        <p:txBody>
-          <a:bodyPr vert="horz" lIns="91440" tIns="45720" rIns="91440" bIns="45720" rtlCol="0" anchor="b">
-            <a:normAutofit/>
-          </a:bodyPr>
-          <a:lstStyle/>
-          <a:p>
-            <a:r>
-              <a:rPr lang="en-US"/>
-              <a:t>Generación de la pipeline</a:t>
-            </a:r>
-          </a:p>
-        </p:txBody>
-      </p:sp>
-      <p:sp>
-        <p:nvSpPr>
-          <p:cNvPr id="4" name="Marcador de contenido 3">
-            <a:extLst>
-              <a:ext uri="{FF2B5EF4-FFF2-40B4-BE49-F238E27FC236}">
-                <a16:creationId xmlns:a16="http://schemas.microsoft.com/office/drawing/2014/main" id="{A4942C97-38D9-E321-E810-35A19F634A57}"/>
-              </a:ext>
-            </a:extLst>
-          </p:cNvPr>
-          <p:cNvSpPr>
-            <a:spLocks noGrp="1"/>
-          </p:cNvSpPr>
-          <p:nvPr>
-            <p:ph sz="half" idx="1"/>
-          </p:nvPr>
-        </p:nvSpPr>
-        <p:spPr>
-          <a:xfrm>
-            <a:off x="718874" y="2325158"/>
-            <a:ext cx="4534048" cy="3854979"/>
-          </a:xfrm>
-        </p:spPr>
-        <p:txBody>
-          <a:bodyPr vert="horz" lIns="91440" tIns="45720" rIns="91440" bIns="45720" rtlCol="0">
-            <a:normAutofit/>
-          </a:bodyPr>
-          <a:lstStyle/>
-          <a:p>
-            <a:endParaRPr lang="en-US" dirty="0"/>
-          </a:p>
-        </p:txBody>
-      </p:sp>
-      <p:pic>
-        <p:nvPicPr>
-          <p:cNvPr id="7" name="Marcador de contenido 6" descr="Texto&#10;&#10;Descripción generada automáticamente">
-            <a:extLst>
-              <a:ext uri="{FF2B5EF4-FFF2-40B4-BE49-F238E27FC236}">
-                <a16:creationId xmlns:a16="http://schemas.microsoft.com/office/drawing/2014/main" id="{C3CEFCC4-5DDB-0ECF-3F68-07781DB5B9AA}"/>
-              </a:ext>
-            </a:extLst>
-          </p:cNvPr>
-          <p:cNvPicPr>
-            <a:picLocks noGrp="1" noChangeAspect="1"/>
-          </p:cNvPicPr>
-          <p:nvPr>
-            <p:ph sz="half" idx="2"/>
-          </p:nvPr>
-        </p:nvPicPr>
-        <p:blipFill>
-          <a:blip r:embed="rId2">
-            <a:extLst>
-              <a:ext uri="{28A0092B-C50C-407E-A947-70E740481C1C}">
-                <a14:useLocalDpi xmlns:a14="http://schemas.microsoft.com/office/drawing/2010/main" val="0"/>
-              </a:ext>
-            </a:extLst>
-          </a:blip>
-          <a:stretch>
-            <a:fillRect/>
-          </a:stretch>
-        </p:blipFill>
-        <p:spPr>
-          <a:xfrm>
-            <a:off x="6148676" y="661484"/>
-            <a:ext cx="4178950" cy="5535031"/>
-          </a:xfrm>
-          <a:prstGeom prst="rect">
-            <a:avLst/>
-          </a:prstGeom>
-        </p:spPr>
-      </p:pic>
-    </p:spTree>
-    <p:extLst>
-      <p:ext uri="{BB962C8B-B14F-4D97-AF65-F5344CB8AC3E}">
-        <p14:creationId xmlns:p14="http://schemas.microsoft.com/office/powerpoint/2010/main" val="795852037"/>
       </p:ext>
     </p:extLst>
   </p:cSld>
@@ -6143,67 +6048,6 @@
           </a:bodyPr>
           <a:lstStyle/>
           <a:p>
-            <a:r>
-              <a:rPr lang="en-US" dirty="0" err="1"/>
-              <a:t>Importación</a:t>
-            </a:r>
-            <a:r>
-              <a:rPr lang="en-US" dirty="0"/>
-              <a:t> de </a:t>
-            </a:r>
-            <a:r>
-              <a:rPr lang="en-US" dirty="0" err="1"/>
-              <a:t>funciones</a:t>
-            </a:r>
-            <a:r>
-              <a:rPr lang="en-US" dirty="0"/>
-              <a:t>, </a:t>
-            </a:r>
-            <a:r>
-              <a:rPr lang="en-US" dirty="0" err="1"/>
-              <a:t>atributos</a:t>
-            </a:r>
-            <a:r>
-              <a:rPr lang="en-US" dirty="0"/>
-              <a:t> y </a:t>
-            </a:r>
-            <a:r>
-              <a:rPr lang="en-US" dirty="0" err="1"/>
-              <a:t>bibliotecas</a:t>
-            </a:r>
-            <a:r>
-              <a:rPr lang="en-US" dirty="0"/>
-              <a:t>. </a:t>
-            </a:r>
-            <a:r>
-              <a:rPr lang="en-US" dirty="0" err="1"/>
-              <a:t>Creación</a:t>
-            </a:r>
-            <a:r>
-              <a:rPr lang="en-US" dirty="0"/>
-              <a:t> del </a:t>
-            </a:r>
-            <a:r>
-              <a:rPr lang="en-US" dirty="0" err="1"/>
-              <a:t>diccionario</a:t>
-            </a:r>
-            <a:r>
-              <a:rPr lang="en-US" dirty="0"/>
-              <a:t> ‘</a:t>
-            </a:r>
-            <a:r>
-              <a:rPr lang="en-US" dirty="0" err="1"/>
-              <a:t>tablas</a:t>
-            </a:r>
-            <a:r>
-              <a:rPr lang="en-US" dirty="0"/>
-              <a:t>’.</a:t>
-            </a:r>
-          </a:p>
-          <a:p>
-            <a:pPr marL="0" indent="0">
-              <a:buNone/>
-            </a:pPr>
             <a:endParaRPr lang="en-US" dirty="0"/>
           </a:p>
         </p:txBody>
@@ -6246,62 +6090,10 @@
           </a:prstGeom>
         </p:spPr>
       </p:pic>
-      <p:sp>
-        <p:nvSpPr>
-          <p:cNvPr id="3" name="Rectángulo 2">
-            <a:extLst>
-              <a:ext uri="{FF2B5EF4-FFF2-40B4-BE49-F238E27FC236}">
-                <a16:creationId xmlns:a16="http://schemas.microsoft.com/office/drawing/2014/main" id="{66F22532-D7DC-D548-E8AC-7C8AD54E8464}"/>
-              </a:ext>
-            </a:extLst>
-          </p:cNvPr>
-          <p:cNvSpPr/>
-          <p:nvPr/>
-        </p:nvSpPr>
-        <p:spPr>
-          <a:xfrm>
-            <a:off x="6218135" y="677863"/>
-            <a:ext cx="2542478" cy="1797707"/>
-          </a:xfrm>
-          <a:prstGeom prst="rect">
-            <a:avLst/>
-          </a:prstGeom>
-          <a:noFill/>
-          <a:ln w="31750">
-            <a:solidFill>
-              <a:schemeClr val="bg1"/>
-            </a:solidFill>
-          </a:ln>
-        </p:spPr>
-        <p:style>
-          <a:lnRef idx="2">
-            <a:schemeClr val="accent1">
-              <a:shade val="50000"/>
-            </a:schemeClr>
-          </a:lnRef>
-          <a:fillRef idx="1">
-            <a:schemeClr val="accent1"/>
-          </a:fillRef>
-          <a:effectRef idx="0">
-            <a:schemeClr val="accent1"/>
-          </a:effectRef>
-          <a:fontRef idx="minor">
-            <a:schemeClr val="lt1"/>
-          </a:fontRef>
-        </p:style>
-        <p:txBody>
-          <a:bodyPr rtlCol="0" anchor="ctr"/>
-          <a:lstStyle/>
-          <a:p>
-            <a:pPr algn="ctr"/>
-            <a:endParaRPr lang="es-ES"/>
-          </a:p>
-        </p:txBody>
-      </p:sp>
     </p:spTree>
     <p:extLst>
       <p:ext uri="{BB962C8B-B14F-4D97-AF65-F5344CB8AC3E}">
-        <p14:creationId xmlns:p14="http://schemas.microsoft.com/office/powerpoint/2010/main" val="2487291924"/>
+        <p14:creationId xmlns:p14="http://schemas.microsoft.com/office/powerpoint/2010/main" val="795852037"/>
       </p:ext>
     </p:extLst>
   </p:cSld>
@@ -6422,12 +6214,8 @@
           <a:lstStyle/>
           <a:p>
             <a:r>
-              <a:rPr lang="en-US" dirty="0" err="1"/>
-              <a:t>Generación</a:t>
-            </a:r>
-            <a:r>
-              <a:rPr lang="en-US" dirty="0"/>
-              <a:t> de un pipeline</a:t>
+              <a:rPr lang="en-US"/>
+              <a:t>Generación de la pipeline</a:t>
             </a:r>
           </a:p>
         </p:txBody>
@@ -6515,67 +6303,6 @@
             <a:r>
               <a:rPr lang="en-US" dirty="0"/>
               <a:t>’.</a:t>
-            </a:r>
-          </a:p>
-          <a:p>
-            <a:r>
-              <a:rPr lang="en-US" dirty="0" err="1"/>
-              <a:t>Definición</a:t>
-            </a:r>
-            <a:r>
-              <a:rPr lang="en-US" dirty="0"/>
-              <a:t> de la </a:t>
-            </a:r>
-            <a:r>
-              <a:rPr lang="en-US" dirty="0" err="1"/>
-              <a:t>función</a:t>
-            </a:r>
-            <a:r>
-              <a:rPr lang="en-US" dirty="0"/>
-              <a:t> de </a:t>
-            </a:r>
-            <a:r>
-              <a:rPr lang="en-US" dirty="0" err="1"/>
-              <a:t>automatización</a:t>
-            </a:r>
-            <a:r>
-              <a:rPr lang="en-US" dirty="0"/>
-              <a:t>:</a:t>
-            </a:r>
-          </a:p>
-          <a:p>
-            <a:pPr lvl="1"/>
-            <a:r>
-              <a:rPr lang="en-US" dirty="0" err="1"/>
-              <a:t>Bloque</a:t>
-            </a:r>
-            <a:r>
-              <a:rPr lang="en-US" dirty="0"/>
-              <a:t> de </a:t>
-            </a:r>
-            <a:r>
-              <a:rPr lang="en-US" dirty="0" err="1"/>
-              <a:t>importación</a:t>
-            </a:r>
-            <a:r>
-              <a:rPr lang="en-US" dirty="0"/>
-              <a:t> y </a:t>
-            </a:r>
-            <a:r>
-              <a:rPr lang="en-US" dirty="0" err="1"/>
-              <a:t>limpieza</a:t>
-            </a:r>
-            <a:r>
-              <a:rPr lang="en-US" dirty="0"/>
-              <a:t> de </a:t>
-            </a:r>
-            <a:r>
-              <a:rPr lang="en-US" dirty="0" err="1"/>
-              <a:t>datos</a:t>
-            </a:r>
-            <a:r>
-              <a:rPr lang="en-US" dirty="0"/>
-              <a:t>.</a:t>
             </a:r>
           </a:p>
           <a:p>
@@ -6638,8 +6365,8 @@
         </p:nvSpPr>
         <p:spPr>
           <a:xfrm>
-            <a:off x="6148675" y="2477242"/>
-            <a:ext cx="3575187" cy="1726768"/>
+            <a:off x="6218135" y="677863"/>
+            <a:ext cx="2542478" cy="1797707"/>
           </a:xfrm>
           <a:prstGeom prst="rect">
             <a:avLst/>
@@ -6679,7 +6406,7 @@
     </p:spTree>
     <p:extLst>
       <p:ext uri="{BB962C8B-B14F-4D97-AF65-F5344CB8AC3E}">
-        <p14:creationId xmlns:p14="http://schemas.microsoft.com/office/powerpoint/2010/main" val="2644699784"/>
+        <p14:creationId xmlns:p14="http://schemas.microsoft.com/office/powerpoint/2010/main" val="2487291924"/>
       </p:ext>
     </p:extLst>
   </p:cSld>
@@ -6860,7 +6587,393 @@
             </a:r>
             <a:r>
               <a:rPr lang="en-US" dirty="0"/>
-              <a:t> y libraries. </a:t>
+              <a:t> y </a:t>
+            </a:r>
+            <a:r>
+              <a:rPr lang="en-US" dirty="0" err="1"/>
+              <a:t>bibliotecas</a:t>
+            </a:r>
+            <a:r>
+              <a:rPr lang="en-US" dirty="0"/>
+              <a:t>. </a:t>
+            </a:r>
+            <a:r>
+              <a:rPr lang="en-US" dirty="0" err="1"/>
+              <a:t>Creación</a:t>
+            </a:r>
+            <a:r>
+              <a:rPr lang="en-US" dirty="0"/>
+              <a:t> del </a:t>
+            </a:r>
+            <a:r>
+              <a:rPr lang="en-US" dirty="0" err="1"/>
+              <a:t>diccionario</a:t>
+            </a:r>
+            <a:r>
+              <a:rPr lang="en-US" dirty="0"/>
+              <a:t> ‘</a:t>
+            </a:r>
+            <a:r>
+              <a:rPr lang="en-US" dirty="0" err="1"/>
+              <a:t>tablas</a:t>
+            </a:r>
+            <a:r>
+              <a:rPr lang="en-US" dirty="0"/>
+              <a:t>’.</a:t>
+            </a:r>
+          </a:p>
+          <a:p>
+            <a:r>
+              <a:rPr lang="en-US" dirty="0" err="1"/>
+              <a:t>Definición</a:t>
+            </a:r>
+            <a:r>
+              <a:rPr lang="en-US" dirty="0"/>
+              <a:t> de la </a:t>
+            </a:r>
+            <a:r>
+              <a:rPr lang="en-US" dirty="0" err="1"/>
+              <a:t>función</a:t>
+            </a:r>
+            <a:r>
+              <a:rPr lang="en-US" dirty="0"/>
+              <a:t> de </a:t>
+            </a:r>
+            <a:r>
+              <a:rPr lang="en-US" dirty="0" err="1"/>
+              <a:t>automatización</a:t>
+            </a:r>
+            <a:r>
+              <a:rPr lang="en-US" dirty="0"/>
+              <a:t>:</a:t>
+            </a:r>
+          </a:p>
+          <a:p>
+            <a:pPr lvl="1"/>
+            <a:r>
+              <a:rPr lang="en-US" dirty="0" err="1"/>
+              <a:t>Bloque</a:t>
+            </a:r>
+            <a:r>
+              <a:rPr lang="en-US" dirty="0"/>
+              <a:t> de </a:t>
+            </a:r>
+            <a:r>
+              <a:rPr lang="en-US" dirty="0" err="1"/>
+              <a:t>importación</a:t>
+            </a:r>
+            <a:r>
+              <a:rPr lang="en-US" dirty="0"/>
+              <a:t> y </a:t>
+            </a:r>
+            <a:r>
+              <a:rPr lang="en-US" dirty="0" err="1"/>
+              <a:t>limpieza</a:t>
+            </a:r>
+            <a:r>
+              <a:rPr lang="en-US" dirty="0"/>
+              <a:t> de </a:t>
+            </a:r>
+            <a:r>
+              <a:rPr lang="en-US" dirty="0" err="1"/>
+              <a:t>datos</a:t>
+            </a:r>
+            <a:r>
+              <a:rPr lang="en-US" dirty="0"/>
+              <a:t>.</a:t>
+            </a:r>
+          </a:p>
+          <a:p>
+            <a:pPr marL="0" indent="0">
+              <a:buNone/>
+            </a:pPr>
+            <a:endParaRPr lang="en-US" dirty="0"/>
+          </a:p>
+        </p:txBody>
+      </p:sp>
+      <p:pic>
+        <p:nvPicPr>
+          <p:cNvPr id="7" name="Marcador de contenido 6" descr="Texto&#10;&#10;Descripción generada automáticamente">
+            <a:extLst>
+              <a:ext uri="{FF2B5EF4-FFF2-40B4-BE49-F238E27FC236}">
+                <a16:creationId xmlns:a16="http://schemas.microsoft.com/office/drawing/2014/main" id="{C3CEFCC4-5DDB-0ECF-3F68-07781DB5B9AA}"/>
+              </a:ext>
+            </a:extLst>
+          </p:cNvPr>
+          <p:cNvPicPr>
+            <a:picLocks noGrp="1" noChangeAspect="1"/>
+          </p:cNvPicPr>
+          <p:nvPr>
+            <p:ph sz="half" idx="2"/>
+          </p:nvPr>
+        </p:nvPicPr>
+        <p:blipFill>
+          <a:blip r:embed="rId2">
+            <a:extLst>
+              <a:ext uri="{28A0092B-C50C-407E-A947-70E740481C1C}">
+                <a14:useLocalDpi xmlns:a14="http://schemas.microsoft.com/office/drawing/2010/main" val="0"/>
+              </a:ext>
+            </a:extLst>
+          </a:blip>
+          <a:stretch>
+            <a:fillRect/>
+          </a:stretch>
+        </p:blipFill>
+        <p:spPr>
+          <a:xfrm>
+            <a:off x="6148676" y="661484"/>
+            <a:ext cx="4178950" cy="5535031"/>
+          </a:xfrm>
+          <a:prstGeom prst="rect">
+            <a:avLst/>
+          </a:prstGeom>
+        </p:spPr>
+      </p:pic>
+      <p:sp>
+        <p:nvSpPr>
+          <p:cNvPr id="3" name="Rectángulo 2">
+            <a:extLst>
+              <a:ext uri="{FF2B5EF4-FFF2-40B4-BE49-F238E27FC236}">
+                <a16:creationId xmlns:a16="http://schemas.microsoft.com/office/drawing/2014/main" id="{66F22532-D7DC-D548-E8AC-7C8AD54E8464}"/>
+              </a:ext>
+            </a:extLst>
+          </p:cNvPr>
+          <p:cNvSpPr/>
+          <p:nvPr/>
+        </p:nvSpPr>
+        <p:spPr>
+          <a:xfrm>
+            <a:off x="6148675" y="2477242"/>
+            <a:ext cx="3575187" cy="1726768"/>
+          </a:xfrm>
+          <a:prstGeom prst="rect">
+            <a:avLst/>
+          </a:prstGeom>
+          <a:noFill/>
+          <a:ln w="31750">
+            <a:solidFill>
+              <a:schemeClr val="bg1"/>
+            </a:solidFill>
+          </a:ln>
+        </p:spPr>
+        <p:style>
+          <a:lnRef idx="2">
+            <a:schemeClr val="accent1">
+              <a:shade val="50000"/>
+            </a:schemeClr>
+          </a:lnRef>
+          <a:fillRef idx="1">
+            <a:schemeClr val="accent1"/>
+          </a:fillRef>
+          <a:effectRef idx="0">
+            <a:schemeClr val="accent1"/>
+          </a:effectRef>
+          <a:fontRef idx="minor">
+            <a:schemeClr val="lt1"/>
+          </a:fontRef>
+        </p:style>
+        <p:txBody>
+          <a:bodyPr rtlCol="0" anchor="ctr"/>
+          <a:lstStyle/>
+          <a:p>
+            <a:pPr algn="ctr"/>
+            <a:endParaRPr lang="es-ES"/>
+          </a:p>
+        </p:txBody>
+      </p:sp>
+    </p:spTree>
+    <p:extLst>
+      <p:ext uri="{BB962C8B-B14F-4D97-AF65-F5344CB8AC3E}">
+        <p14:creationId xmlns:p14="http://schemas.microsoft.com/office/powerpoint/2010/main" val="2644699784"/>
+      </p:ext>
+    </p:extLst>
+  </p:cSld>
+  <p:clrMapOvr>
+    <a:masterClrMapping/>
+  </p:clrMapOvr>
+</p:sld>
+</file>
+
+<file path=ppt/slides/slide27.xml><?xml version="1.0" encoding="utf-8"?>
+<p:sld xmlns:a="http://schemas.openxmlformats.org/drawingml/2006/main" xmlns:r="http://schemas.openxmlformats.org/officeDocument/2006/relationships" xmlns:p="http://schemas.openxmlformats.org/presentationml/2006/main">
+  <p:cSld>
+    <p:bg>
+      <p:bgPr>
+        <a:solidFill>
+          <a:schemeClr val="bg1"/>
+        </a:solidFill>
+        <a:effectLst/>
+      </p:bgPr>
+    </p:bg>
+    <p:spTree>
+      <p:nvGrpSpPr>
+        <p:cNvPr id="1" name=""/>
+        <p:cNvGrpSpPr/>
+        <p:nvPr/>
+      </p:nvGrpSpPr>
+      <p:grpSpPr>
+        <a:xfrm>
+          <a:off x="0" y="0"/>
+          <a:ext cx="0" cy="0"/>
+          <a:chOff x="0" y="0"/>
+          <a:chExt cx="0" cy="0"/>
+        </a:xfrm>
+      </p:grpSpPr>
+      <p:sp>
+        <p:nvSpPr>
+          <p:cNvPr id="12" name="Rectangle 11">
+            <a:extLst>
+              <a:ext uri="{FF2B5EF4-FFF2-40B4-BE49-F238E27FC236}">
+                <a16:creationId xmlns:a16="http://schemas.microsoft.com/office/drawing/2014/main" id="{6FA0A1AD-DEE2-4598-8D3B-C1F65F315A79}"/>
+              </a:ext>
+              <a:ext uri="{C183D7F6-B498-43B3-948B-1728B52AA6E4}">
+                <adec:decorative xmlns:adec="http://schemas.microsoft.com/office/drawing/2017/decorative" val="1"/>
+              </a:ext>
+            </a:extLst>
+          </p:cNvPr>
+          <p:cNvSpPr>
+            <a:spLocks noGrp="1" noRot="1" noChangeAspect="1" noMove="1" noResize="1" noEditPoints="1" noAdjustHandles="1" noChangeArrowheads="1" noChangeShapeType="1" noTextEdit="1"/>
+          </p:cNvSpPr>
+          <p:nvPr>
+            <p:extLst>
+              <p:ext uri="{386F3935-93C4-4BCD-93E2-E3B085C9AB24}">
+                <p16:designElem xmlns:p16="http://schemas.microsoft.com/office/powerpoint/2015/main" val="1"/>
+              </p:ext>
+            </p:extLst>
+          </p:nvPr>
+        </p:nvSpPr>
+        <p:spPr>
+          <a:xfrm>
+            <a:off x="11292840" y="0"/>
+            <a:ext cx="914400" cy="6858000"/>
+          </a:xfrm>
+          <a:prstGeom prst="rect">
+            <a:avLst/>
+          </a:prstGeom>
+          <a:solidFill>
+            <a:schemeClr val="tx2">
+              <a:lumMod val="75000"/>
+            </a:schemeClr>
+          </a:solidFill>
+          <a:ln>
+            <a:noFill/>
+          </a:ln>
+        </p:spPr>
+        <p:style>
+          <a:lnRef idx="2">
+            <a:schemeClr val="accent1">
+              <a:shade val="50000"/>
+            </a:schemeClr>
+          </a:lnRef>
+          <a:fillRef idx="1">
+            <a:schemeClr val="accent1"/>
+          </a:fillRef>
+          <a:effectRef idx="0">
+            <a:schemeClr val="accent1"/>
+          </a:effectRef>
+          <a:fontRef idx="minor">
+            <a:schemeClr val="lt1"/>
+          </a:fontRef>
+        </p:style>
+      </p:sp>
+      <p:sp>
+        <p:nvSpPr>
+          <p:cNvPr id="2" name="Título 1">
+            <a:extLst>
+              <a:ext uri="{FF2B5EF4-FFF2-40B4-BE49-F238E27FC236}">
+                <a16:creationId xmlns:a16="http://schemas.microsoft.com/office/drawing/2014/main" id="{10B6794C-5B34-27A6-F897-2FE976E8589E}"/>
+              </a:ext>
+            </a:extLst>
+          </p:cNvPr>
+          <p:cNvSpPr>
+            <a:spLocks noGrp="1"/>
+          </p:cNvSpPr>
+          <p:nvPr>
+            <p:ph type="title"/>
+          </p:nvPr>
+        </p:nvSpPr>
+        <p:spPr>
+          <a:xfrm>
+            <a:off x="718874" y="677863"/>
+            <a:ext cx="4534047" cy="1325562"/>
+          </a:xfrm>
+        </p:spPr>
+        <p:txBody>
+          <a:bodyPr vert="horz" lIns="91440" tIns="45720" rIns="91440" bIns="45720" rtlCol="0" anchor="b">
+            <a:normAutofit/>
+          </a:bodyPr>
+          <a:lstStyle/>
+          <a:p>
+            <a:r>
+              <a:rPr lang="en-US" dirty="0" err="1"/>
+              <a:t>Generación</a:t>
+            </a:r>
+            <a:r>
+              <a:rPr lang="en-US" dirty="0"/>
+              <a:t> de un pipeline</a:t>
+            </a:r>
+          </a:p>
+        </p:txBody>
+      </p:sp>
+      <p:sp>
+        <p:nvSpPr>
+          <p:cNvPr id="4" name="Marcador de contenido 3">
+            <a:extLst>
+              <a:ext uri="{FF2B5EF4-FFF2-40B4-BE49-F238E27FC236}">
+                <a16:creationId xmlns:a16="http://schemas.microsoft.com/office/drawing/2014/main" id="{A4942C97-38D9-E321-E810-35A19F634A57}"/>
+              </a:ext>
+            </a:extLst>
+          </p:cNvPr>
+          <p:cNvSpPr>
+            <a:spLocks noGrp="1"/>
+          </p:cNvSpPr>
+          <p:nvPr>
+            <p:ph sz="half" idx="1"/>
+          </p:nvPr>
+        </p:nvSpPr>
+        <p:spPr>
+          <a:xfrm>
+            <a:off x="718874" y="2325158"/>
+            <a:ext cx="4534048" cy="3854979"/>
+          </a:xfrm>
+        </p:spPr>
+        <p:txBody>
+          <a:bodyPr vert="horz" lIns="91440" tIns="45720" rIns="91440" bIns="45720" rtlCol="0">
+            <a:normAutofit/>
+          </a:bodyPr>
+          <a:lstStyle/>
+          <a:p>
+            <a:r>
+              <a:rPr lang="en-US" dirty="0" err="1"/>
+              <a:t>Importación</a:t>
+            </a:r>
+            <a:r>
+              <a:rPr lang="en-US" dirty="0"/>
+              <a:t> de </a:t>
+            </a:r>
+            <a:r>
+              <a:rPr lang="en-US" dirty="0" err="1"/>
+              <a:t>funciones</a:t>
+            </a:r>
+            <a:r>
+              <a:rPr lang="en-US" dirty="0"/>
+              <a:t>, </a:t>
+            </a:r>
+            <a:r>
+              <a:rPr lang="en-US" dirty="0" err="1"/>
+              <a:t>atributos</a:t>
+            </a:r>
+            <a:r>
+              <a:rPr lang="en-US" dirty="0"/>
+              <a:t> y </a:t>
+            </a:r>
+            <a:r>
+              <a:rPr lang="en-US" dirty="0" err="1"/>
+              <a:t>bibliotecas</a:t>
+            </a:r>
+            <a:r>
+              <a:rPr lang="en-US" dirty="0"/>
+              <a:t>. </a:t>
             </a:r>
             <a:r>
               <a:rPr lang="en-US" dirty="0" err="1"/>
@@ -7086,164 +7199,6 @@
 </p:sld>
 </file>
 
-<file path=ppt/slides/slide27.xml><?xml version="1.0" encoding="utf-8"?>
-<p:sld xmlns:a="http://schemas.openxmlformats.org/drawingml/2006/main" xmlns:r="http://schemas.openxmlformats.org/officeDocument/2006/relationships" xmlns:p="http://schemas.openxmlformats.org/presentationml/2006/main">
-  <p:cSld>
-    <p:spTree>
-      <p:nvGrpSpPr>
-        <p:cNvPr id="1" name=""/>
-        <p:cNvGrpSpPr/>
-        <p:nvPr/>
-      </p:nvGrpSpPr>
-      <p:grpSpPr>
-        <a:xfrm>
-          <a:off x="0" y="0"/>
-          <a:ext cx="0" cy="0"/>
-          <a:chOff x="0" y="0"/>
-          <a:chExt cx="0" cy="0"/>
-        </a:xfrm>
-      </p:grpSpPr>
-      <p:sp>
-        <p:nvSpPr>
-          <p:cNvPr id="2" name="Título 1">
-            <a:extLst>
-              <a:ext uri="{FF2B5EF4-FFF2-40B4-BE49-F238E27FC236}">
-                <a16:creationId xmlns:a16="http://schemas.microsoft.com/office/drawing/2014/main" id="{B3F57F75-4D44-F3CB-0DFA-8F36506D9E5D}"/>
-              </a:ext>
-            </a:extLst>
-          </p:cNvPr>
-          <p:cNvSpPr>
-            <a:spLocks noGrp="1"/>
-          </p:cNvSpPr>
-          <p:nvPr>
-            <p:ph type="title"/>
-          </p:nvPr>
-        </p:nvSpPr>
-        <p:spPr/>
-        <p:txBody>
-          <a:bodyPr/>
-          <a:lstStyle/>
-          <a:p>
-            <a:r>
-              <a:rPr lang="es-ES" dirty="0"/>
-              <a:t>Definición de los atributos</a:t>
-            </a:r>
-          </a:p>
-        </p:txBody>
-      </p:sp>
-      <p:pic>
-        <p:nvPicPr>
-          <p:cNvPr id="6" name="Marcador de contenido 5" descr="Texto&#10;&#10;Descripción generada automáticamente">
-            <a:extLst>
-              <a:ext uri="{FF2B5EF4-FFF2-40B4-BE49-F238E27FC236}">
-                <a16:creationId xmlns:a16="http://schemas.microsoft.com/office/drawing/2014/main" id="{E3B725C0-2F24-EF86-84B1-E55E78CB870E}"/>
-              </a:ext>
-            </a:extLst>
-          </p:cNvPr>
-          <p:cNvPicPr>
-            <a:picLocks noGrp="1" noChangeAspect="1"/>
-          </p:cNvPicPr>
-          <p:nvPr>
-            <p:ph sz="half" idx="2"/>
-          </p:nvPr>
-        </p:nvPicPr>
-        <p:blipFill>
-          <a:blip r:embed="rId2">
-            <a:extLst>
-              <a:ext uri="{28A0092B-C50C-407E-A947-70E740481C1C}">
-                <a14:useLocalDpi xmlns:a14="http://schemas.microsoft.com/office/drawing/2010/main" val="0"/>
-              </a:ext>
-            </a:extLst>
-          </a:blip>
-          <a:stretch>
-            <a:fillRect/>
-          </a:stretch>
-        </p:blipFill>
-        <p:spPr>
-          <a:xfrm>
-            <a:off x="2076966" y="1951463"/>
-            <a:ext cx="8033784" cy="1778909"/>
-          </a:xfrm>
-        </p:spPr>
-      </p:pic>
-      <p:sp>
-        <p:nvSpPr>
-          <p:cNvPr id="7" name="Marcador de contenido 2">
-            <a:extLst>
-              <a:ext uri="{FF2B5EF4-FFF2-40B4-BE49-F238E27FC236}">
-                <a16:creationId xmlns:a16="http://schemas.microsoft.com/office/drawing/2014/main" id="{EBA6A6C3-1929-4998-5DB8-72AA1CE740FA}"/>
-              </a:ext>
-            </a:extLst>
-          </p:cNvPr>
-          <p:cNvSpPr>
-            <a:spLocks noGrp="1"/>
-          </p:cNvSpPr>
-          <p:nvPr>
-            <p:ph idx="1"/>
-          </p:nvPr>
-        </p:nvSpPr>
-        <p:spPr>
-          <a:xfrm>
-            <a:off x="1261872" y="4237463"/>
-            <a:ext cx="8595360" cy="1942674"/>
-          </a:xfrm>
-        </p:spPr>
-        <p:txBody>
-          <a:bodyPr/>
-          <a:lstStyle/>
-          <a:p>
-            <a:r>
-              <a:rPr lang="es-ES" dirty="0"/>
-              <a:t>Archivos: diccionario con el </a:t>
-            </a:r>
-            <a:r>
-              <a:rPr lang="es-ES" dirty="0" err="1"/>
-              <a:t>path</a:t>
-            </a:r>
-            <a:r>
-              <a:rPr lang="es-ES" dirty="0"/>
-              <a:t> de donde obtener el archivo .</a:t>
-            </a:r>
-            <a:r>
-              <a:rPr lang="es-ES" dirty="0" err="1"/>
-              <a:t>csv</a:t>
-            </a:r>
-            <a:r>
-              <a:rPr lang="es-ES" dirty="0"/>
-              <a:t> y el nombre que se le asignará a la tabla (es decir, a la base de datos en Python).</a:t>
-            </a:r>
-          </a:p>
-          <a:p>
-            <a:r>
-              <a:rPr lang="es-ES" dirty="0" err="1"/>
-              <a:t>Server_data</a:t>
-            </a:r>
-            <a:r>
-              <a:rPr lang="es-ES" dirty="0"/>
-              <a:t>: contiene el nombre del servidor y la base de datos.</a:t>
-            </a:r>
-          </a:p>
-          <a:p>
-            <a:endParaRPr lang="es-ES" dirty="0"/>
-          </a:p>
-          <a:p>
-            <a:endParaRPr lang="es-ES" dirty="0"/>
-          </a:p>
-        </p:txBody>
-      </p:sp>
-    </p:spTree>
-    <p:extLst>
-      <p:ext uri="{BB962C8B-B14F-4D97-AF65-F5344CB8AC3E}">
-        <p14:creationId xmlns:p14="http://schemas.microsoft.com/office/powerpoint/2010/main" val="991770663"/>
-      </p:ext>
-    </p:extLst>
-  </p:cSld>
-  <p:clrMapOvr>
-    <a:masterClrMapping/>
-  </p:clrMapOvr>
-</p:sld>
-</file>
-
 <file path=ppt/slides/slide28.xml><?xml version="1.0" encoding="utf-8"?>
 <p:sld xmlns:a="http://schemas.openxmlformats.org/drawingml/2006/main" xmlns:r="http://schemas.openxmlformats.org/officeDocument/2006/relationships" xmlns:p="http://schemas.openxmlformats.org/presentationml/2006/main">
   <p:cSld>
@@ -7261,10 +7216,414 @@
           <a:chExt cx="0" cy="0"/>
         </a:xfrm>
       </p:grpSpPr>
+      <p:sp>
+        <p:nvSpPr>
+          <p:cNvPr id="2" name="Título 1">
+            <a:extLst>
+              <a:ext uri="{FF2B5EF4-FFF2-40B4-BE49-F238E27FC236}">
+                <a16:creationId xmlns:a16="http://schemas.microsoft.com/office/drawing/2014/main" id="{B3F57F75-4D44-F3CB-0DFA-8F36506D9E5D}"/>
+              </a:ext>
+            </a:extLst>
+          </p:cNvPr>
+          <p:cNvSpPr>
+            <a:spLocks noGrp="1"/>
+          </p:cNvSpPr>
+          <p:nvPr>
+            <p:ph type="title"/>
+          </p:nvPr>
+        </p:nvSpPr>
+        <p:spPr/>
+        <p:txBody>
+          <a:bodyPr/>
+          <a:lstStyle/>
+          <a:p>
+            <a:r>
+              <a:rPr lang="es-ES" dirty="0"/>
+              <a:t>Definición de los atributos</a:t>
+            </a:r>
+          </a:p>
+        </p:txBody>
+      </p:sp>
+      <p:pic>
+        <p:nvPicPr>
+          <p:cNvPr id="6" name="Marcador de contenido 5" descr="Texto&#10;&#10;Descripción generada automáticamente">
+            <a:extLst>
+              <a:ext uri="{FF2B5EF4-FFF2-40B4-BE49-F238E27FC236}">
+                <a16:creationId xmlns:a16="http://schemas.microsoft.com/office/drawing/2014/main" id="{E3B725C0-2F24-EF86-84B1-E55E78CB870E}"/>
+              </a:ext>
+            </a:extLst>
+          </p:cNvPr>
+          <p:cNvPicPr>
+            <a:picLocks noGrp="1" noChangeAspect="1"/>
+          </p:cNvPicPr>
+          <p:nvPr>
+            <p:ph sz="half" idx="2"/>
+          </p:nvPr>
+        </p:nvPicPr>
+        <p:blipFill>
+          <a:blip r:embed="rId2">
+            <a:extLst>
+              <a:ext uri="{28A0092B-C50C-407E-A947-70E740481C1C}">
+                <a14:useLocalDpi xmlns:a14="http://schemas.microsoft.com/office/drawing/2010/main" val="0"/>
+              </a:ext>
+            </a:extLst>
+          </a:blip>
+          <a:stretch>
+            <a:fillRect/>
+          </a:stretch>
+        </p:blipFill>
+        <p:spPr>
+          <a:xfrm>
+            <a:off x="2076966" y="1951463"/>
+            <a:ext cx="8033784" cy="1778909"/>
+          </a:xfrm>
+        </p:spPr>
+      </p:pic>
+      <p:sp>
+        <p:nvSpPr>
+          <p:cNvPr id="7" name="Marcador de contenido 2">
+            <a:extLst>
+              <a:ext uri="{FF2B5EF4-FFF2-40B4-BE49-F238E27FC236}">
+                <a16:creationId xmlns:a16="http://schemas.microsoft.com/office/drawing/2014/main" id="{EBA6A6C3-1929-4998-5DB8-72AA1CE740FA}"/>
+              </a:ext>
+            </a:extLst>
+          </p:cNvPr>
+          <p:cNvSpPr>
+            <a:spLocks noGrp="1"/>
+          </p:cNvSpPr>
+          <p:nvPr>
+            <p:ph idx="1"/>
+          </p:nvPr>
+        </p:nvSpPr>
+        <p:spPr>
+          <a:xfrm>
+            <a:off x="1261872" y="4237463"/>
+            <a:ext cx="8595360" cy="1942674"/>
+          </a:xfrm>
+        </p:spPr>
+        <p:txBody>
+          <a:bodyPr/>
+          <a:lstStyle/>
+          <a:p>
+            <a:r>
+              <a:rPr lang="es-ES" dirty="0"/>
+              <a:t>Archivos: diccionario con el </a:t>
+            </a:r>
+            <a:r>
+              <a:rPr lang="es-ES" dirty="0" err="1"/>
+              <a:t>path</a:t>
+            </a:r>
+            <a:r>
+              <a:rPr lang="es-ES" dirty="0"/>
+              <a:t> de donde obtener el archivo .</a:t>
+            </a:r>
+            <a:r>
+              <a:rPr lang="es-ES" dirty="0" err="1"/>
+              <a:t>csv</a:t>
+            </a:r>
+            <a:r>
+              <a:rPr lang="es-ES" dirty="0"/>
+              <a:t> y el nombre que se le asignará a la tabla (es decir, a la base de datos en Python).</a:t>
+            </a:r>
+          </a:p>
+          <a:p>
+            <a:r>
+              <a:rPr lang="es-ES" dirty="0" err="1"/>
+              <a:t>Server_data</a:t>
+            </a:r>
+            <a:r>
+              <a:rPr lang="es-ES" dirty="0"/>
+              <a:t>: contiene el nombre del servidor y la base de datos.</a:t>
+            </a:r>
+          </a:p>
+          <a:p>
+            <a:endParaRPr lang="es-ES" dirty="0"/>
+          </a:p>
+          <a:p>
+            <a:endParaRPr lang="es-ES" dirty="0"/>
+          </a:p>
+        </p:txBody>
+      </p:sp>
     </p:spTree>
     <p:extLst>
       <p:ext uri="{BB962C8B-B14F-4D97-AF65-F5344CB8AC3E}">
-        <p14:creationId xmlns:p14="http://schemas.microsoft.com/office/powerpoint/2010/main" val="2477330860"/>
+        <p14:creationId xmlns:p14="http://schemas.microsoft.com/office/powerpoint/2010/main" val="991770663"/>
+      </p:ext>
+    </p:extLst>
+  </p:cSld>
+  <p:clrMapOvr>
+    <a:masterClrMapping/>
+  </p:clrMapOvr>
+</p:sld>
+</file>
+
+<file path=ppt/slides/slide29.xml><?xml version="1.0" encoding="utf-8"?>
+<p:sld xmlns:a="http://schemas.openxmlformats.org/drawingml/2006/main" xmlns:r="http://schemas.openxmlformats.org/officeDocument/2006/relationships" xmlns:p="http://schemas.openxmlformats.org/presentationml/2006/main">
+  <p:cSld>
+    <p:bg>
+      <p:bgPr>
+        <a:solidFill>
+          <a:schemeClr val="bg1"/>
+        </a:solidFill>
+        <a:effectLst/>
+      </p:bgPr>
+    </p:bg>
+    <p:spTree>
+      <p:nvGrpSpPr>
+        <p:cNvPr id="1" name=""/>
+        <p:cNvGrpSpPr/>
+        <p:nvPr/>
+      </p:nvGrpSpPr>
+      <p:grpSpPr>
+        <a:xfrm>
+          <a:off x="0" y="0"/>
+          <a:ext cx="0" cy="0"/>
+          <a:chOff x="0" y="0"/>
+          <a:chExt cx="0" cy="0"/>
+        </a:xfrm>
+      </p:grpSpPr>
+      <p:sp>
+        <p:nvSpPr>
+          <p:cNvPr id="2" name="Título 1">
+            <a:extLst>
+              <a:ext uri="{FF2B5EF4-FFF2-40B4-BE49-F238E27FC236}">
+                <a16:creationId xmlns:a16="http://schemas.microsoft.com/office/drawing/2014/main" id="{27D01F78-8933-8D40-E61E-039B56A35930}"/>
+              </a:ext>
+            </a:extLst>
+          </p:cNvPr>
+          <p:cNvSpPr>
+            <a:spLocks noGrp="1"/>
+          </p:cNvSpPr>
+          <p:nvPr>
+            <p:ph type="title"/>
+          </p:nvPr>
+        </p:nvSpPr>
+        <p:spPr>
+          <a:xfrm>
+            <a:off x="643831" y="1298000"/>
+            <a:ext cx="3690425" cy="1363344"/>
+          </a:xfrm>
+        </p:spPr>
+        <p:txBody>
+          <a:bodyPr>
+            <a:normAutofit/>
+          </a:bodyPr>
+          <a:lstStyle/>
+          <a:p>
+            <a:r>
+              <a:rPr lang="es-ES" sz="3200"/>
+              <a:t>Prueba de Funcionamiento</a:t>
+            </a:r>
+          </a:p>
+        </p:txBody>
+      </p:sp>
+      <p:sp>
+        <p:nvSpPr>
+          <p:cNvPr id="9" name="Content Placeholder 8">
+            <a:extLst>
+              <a:ext uri="{FF2B5EF4-FFF2-40B4-BE49-F238E27FC236}">
+                <a16:creationId xmlns:a16="http://schemas.microsoft.com/office/drawing/2014/main" id="{FB87C871-6220-9B5C-43CC-D3E37037B1AE}"/>
+              </a:ext>
+            </a:extLst>
+          </p:cNvPr>
+          <p:cNvSpPr>
+            <a:spLocks noGrp="1"/>
+          </p:cNvSpPr>
+          <p:nvPr>
+            <p:ph idx="1"/>
+          </p:nvPr>
+        </p:nvSpPr>
+        <p:spPr>
+          <a:xfrm>
+            <a:off x="643831" y="2983077"/>
+            <a:ext cx="3690425" cy="3854979"/>
+          </a:xfrm>
+        </p:spPr>
+        <p:txBody>
+          <a:bodyPr>
+            <a:normAutofit/>
+          </a:bodyPr>
+          <a:lstStyle/>
+          <a:p>
+            <a:pPr marL="0" indent="0">
+              <a:buNone/>
+            </a:pPr>
+            <a:r>
+              <a:rPr lang="en-US" dirty="0"/>
+              <a:t>Respuesta </a:t>
+            </a:r>
+            <a:r>
+              <a:rPr lang="en-US" dirty="0" err="1"/>
+              <a:t>obtenida</a:t>
+            </a:r>
+            <a:r>
+              <a:rPr lang="en-US" dirty="0"/>
+              <a:t> al </a:t>
+            </a:r>
+            <a:r>
+              <a:rPr lang="en-US" dirty="0" err="1"/>
+              <a:t>correr</a:t>
+            </a:r>
+            <a:r>
+              <a:rPr lang="en-US" dirty="0"/>
+              <a:t> </a:t>
+            </a:r>
+            <a:r>
+              <a:rPr lang="en-US" dirty="0" err="1"/>
+              <a:t>el</a:t>
+            </a:r>
+            <a:r>
+              <a:rPr lang="en-US" dirty="0"/>
+              <a:t> archive main.py. </a:t>
+            </a:r>
+          </a:p>
+          <a:p>
+            <a:pPr marL="0" indent="0">
+              <a:buNone/>
+            </a:pPr>
+            <a:r>
+              <a:rPr lang="en-US" dirty="0"/>
+              <a:t>La </a:t>
+            </a:r>
+            <a:r>
+              <a:rPr lang="en-US" dirty="0" err="1"/>
+              <a:t>carpeta</a:t>
+            </a:r>
+            <a:r>
+              <a:rPr lang="en-US" dirty="0"/>
+              <a:t> que </a:t>
+            </a:r>
+            <a:r>
+              <a:rPr lang="en-US" dirty="0" err="1"/>
+              <a:t>contiene</a:t>
+            </a:r>
+            <a:r>
+              <a:rPr lang="en-US" dirty="0"/>
+              <a:t> </a:t>
+            </a:r>
+            <a:r>
+              <a:rPr lang="en-US" dirty="0" err="1"/>
+              <a:t>los</a:t>
+            </a:r>
+            <a:r>
+              <a:rPr lang="en-US" dirty="0"/>
+              <a:t> </a:t>
+            </a:r>
+            <a:r>
+              <a:rPr lang="en-US" dirty="0" err="1"/>
+              <a:t>archivos</a:t>
+            </a:r>
+            <a:r>
+              <a:rPr lang="en-US" dirty="0"/>
+              <a:t> </a:t>
+            </a:r>
+            <a:r>
+              <a:rPr lang="en-US" dirty="0" err="1"/>
+              <a:t>usados</a:t>
+            </a:r>
+            <a:r>
+              <a:rPr lang="en-US" dirty="0"/>
+              <a:t> se </a:t>
+            </a:r>
+            <a:r>
+              <a:rPr lang="en-US" dirty="0" err="1"/>
+              <a:t>encuentra</a:t>
+            </a:r>
+            <a:r>
+              <a:rPr lang="en-US" dirty="0"/>
+              <a:t> a </a:t>
+            </a:r>
+            <a:r>
+              <a:rPr lang="en-US" dirty="0" err="1"/>
+              <a:t>su</a:t>
+            </a:r>
+            <a:r>
+              <a:rPr lang="en-US" dirty="0"/>
+              <a:t> </a:t>
+            </a:r>
+            <a:r>
+              <a:rPr lang="en-US" dirty="0" err="1"/>
+              <a:t>disposicion</a:t>
+            </a:r>
+            <a:r>
+              <a:rPr lang="en-US" dirty="0"/>
+              <a:t> </a:t>
+            </a:r>
+            <a:r>
+              <a:rPr lang="en-US" dirty="0" err="1"/>
+              <a:t>por</a:t>
+            </a:r>
+            <a:r>
+              <a:rPr lang="en-US" dirty="0"/>
+              <a:t> </a:t>
+            </a:r>
+            <a:r>
+              <a:rPr lang="en-US" dirty="0" err="1"/>
+              <a:t>si</a:t>
+            </a:r>
+            <a:r>
+              <a:rPr lang="en-US" dirty="0"/>
+              <a:t> </a:t>
+            </a:r>
+            <a:r>
+              <a:rPr lang="en-US" dirty="0" err="1"/>
+              <a:t>desean</a:t>
+            </a:r>
+            <a:r>
+              <a:rPr lang="en-US" dirty="0"/>
+              <a:t> </a:t>
+            </a:r>
+            <a:r>
+              <a:rPr lang="en-US" dirty="0" err="1"/>
+              <a:t>revisarlos</a:t>
+            </a:r>
+            <a:r>
+              <a:rPr lang="en-US" dirty="0"/>
+              <a:t>.</a:t>
+            </a:r>
+          </a:p>
+        </p:txBody>
+      </p:sp>
+      <p:pic>
+        <p:nvPicPr>
+          <p:cNvPr id="5" name="Marcador de contenido 4" descr="Texto&#10;&#10;Descripción generada automáticamente">
+            <a:extLst>
+              <a:ext uri="{FF2B5EF4-FFF2-40B4-BE49-F238E27FC236}">
+                <a16:creationId xmlns:a16="http://schemas.microsoft.com/office/drawing/2014/main" id="{236E5371-5013-CFCF-6F91-F8935D1D9147}"/>
+              </a:ext>
+            </a:extLst>
+          </p:cNvPr>
+          <p:cNvPicPr>
+            <a:picLocks noChangeAspect="1"/>
+          </p:cNvPicPr>
+          <p:nvPr/>
+        </p:nvPicPr>
+        <p:blipFill>
+          <a:blip r:embed="rId2">
+            <a:extLst>
+              <a:ext uri="{28A0092B-C50C-407E-A947-70E740481C1C}">
+                <a14:useLocalDpi xmlns:a14="http://schemas.microsoft.com/office/drawing/2010/main" val="0"/>
+              </a:ext>
+            </a:extLst>
+          </a:blip>
+          <a:stretch>
+            <a:fillRect/>
+          </a:stretch>
+        </p:blipFill>
+        <p:spPr>
+          <a:xfrm>
+            <a:off x="4654296" y="1587410"/>
+            <a:ext cx="6155736" cy="3693440"/>
+          </a:xfrm>
+          <a:prstGeom prst="rect">
+            <a:avLst/>
+          </a:prstGeom>
+        </p:spPr>
+      </p:pic>
+    </p:spTree>
+    <p:extLst>
+      <p:ext uri="{BB962C8B-B14F-4D97-AF65-F5344CB8AC3E}">
+        <p14:creationId xmlns:p14="http://schemas.microsoft.com/office/powerpoint/2010/main" val="600599171"/>
       </p:ext>
     </p:extLst>
   </p:cSld>
@@ -7296,7 +7655,7 @@
           <p:cNvPr id="2" name="Título 1">
             <a:extLst>
               <a:ext uri="{FF2B5EF4-FFF2-40B4-BE49-F238E27FC236}">
-                <a16:creationId xmlns:a16="http://schemas.microsoft.com/office/drawing/2014/main" id="{E839F22C-FA05-61A3-1CCB-3567A618B57D}"/>
+                <a16:creationId xmlns:a16="http://schemas.microsoft.com/office/drawing/2014/main" id="{93786E73-0130-CEE4-304D-F9C9271841C6}"/>
               </a:ext>
             </a:extLst>
           </p:cNvPr>
@@ -7314,75 +7673,17 @@
           <a:p>
             <a:r>
               <a:rPr lang="es-ES" dirty="0"/>
-              <a:t>Obtención y preparación de los datos</a:t>
-            </a:r>
-          </a:p>
-        </p:txBody>
-      </p:sp>
-    </p:spTree>
-    <p:extLst>
-      <p:ext uri="{BB962C8B-B14F-4D97-AF65-F5344CB8AC3E}">
-        <p14:creationId xmlns:p14="http://schemas.microsoft.com/office/powerpoint/2010/main" val="3641053661"/>
-      </p:ext>
-    </p:extLst>
-  </p:cSld>
-  <p:clrMapOvr>
-    <a:masterClrMapping/>
-  </p:clrMapOvr>
-</p:sld>
-</file>
-
-<file path=ppt/slides/slide4.xml><?xml version="1.0" encoding="utf-8"?>
-<p:sld xmlns:a="http://schemas.openxmlformats.org/drawingml/2006/main" xmlns:r="http://schemas.openxmlformats.org/officeDocument/2006/relationships" xmlns:p="http://schemas.openxmlformats.org/presentationml/2006/main">
-  <p:cSld>
-    <p:spTree>
-      <p:nvGrpSpPr>
-        <p:cNvPr id="1" name=""/>
-        <p:cNvGrpSpPr/>
-        <p:nvPr/>
-      </p:nvGrpSpPr>
-      <p:grpSpPr>
-        <a:xfrm>
-          <a:off x="0" y="0"/>
-          <a:ext cx="0" cy="0"/>
-          <a:chOff x="0" y="0"/>
-          <a:chExt cx="0" cy="0"/>
-        </a:xfrm>
-      </p:grpSpPr>
-      <p:sp>
-        <p:nvSpPr>
-          <p:cNvPr id="2" name="Título 1">
-            <a:extLst>
-              <a:ext uri="{FF2B5EF4-FFF2-40B4-BE49-F238E27FC236}">
-                <a16:creationId xmlns:a16="http://schemas.microsoft.com/office/drawing/2014/main" id="{12F4CC32-138E-33C8-987D-3B0CD4EF6728}"/>
-              </a:ext>
-            </a:extLst>
-          </p:cNvPr>
-          <p:cNvSpPr>
-            <a:spLocks noGrp="1"/>
-          </p:cNvSpPr>
-          <p:nvPr>
-            <p:ph type="title"/>
-          </p:nvPr>
-        </p:nvSpPr>
-        <p:spPr/>
-        <p:txBody>
-          <a:bodyPr/>
-          <a:lstStyle/>
-          <a:p>
-            <a:r>
-              <a:rPr lang="es-ES" dirty="0"/>
-              <a:t>Carga y Limpieza de los datos:</a:t>
+              <a:t>Estructura</a:t>
             </a:r>
           </a:p>
         </p:txBody>
       </p:sp>
       <p:pic>
         <p:nvPicPr>
-          <p:cNvPr id="5" name="Marcador de contenido 4" descr="Texto&#10;&#10;Descripción generada automáticamente">
-            <a:extLst>
-              <a:ext uri="{FF2B5EF4-FFF2-40B4-BE49-F238E27FC236}">
-                <a16:creationId xmlns:a16="http://schemas.microsoft.com/office/drawing/2014/main" id="{4185BADC-63C5-2716-B1EB-DEF763CDCE50}"/>
+          <p:cNvPr id="5" name="Marcador de contenido 4" descr="Interfaz de usuario gráfica, Texto&#10;&#10;Descripción generada automáticamente">
+            <a:extLst>
+              <a:ext uri="{FF2B5EF4-FFF2-40B4-BE49-F238E27FC236}">
+                <a16:creationId xmlns:a16="http://schemas.microsoft.com/office/drawing/2014/main" id="{9A84C673-BC1A-1ABF-2D59-F4563A1BEF88}"/>
               </a:ext>
             </a:extLst>
           </p:cNvPr>
@@ -7407,8 +7708,8 @@
         </p:blipFill>
         <p:spPr>
           <a:xfrm>
-            <a:off x="2489232" y="4622599"/>
-            <a:ext cx="6140638" cy="1557538"/>
+            <a:off x="3828872" y="1994904"/>
+            <a:ext cx="4534255" cy="1986079"/>
           </a:xfrm>
         </p:spPr>
       </p:pic>
@@ -7417,7 +7718,7 @@
           <p:cNvPr id="6" name="Marcador de contenido 2">
             <a:extLst>
               <a:ext uri="{FF2B5EF4-FFF2-40B4-BE49-F238E27FC236}">
-                <a16:creationId xmlns:a16="http://schemas.microsoft.com/office/drawing/2014/main" id="{12D82559-AED9-CA79-9923-F1F7E8FB5FE0}"/>
+                <a16:creationId xmlns:a16="http://schemas.microsoft.com/office/drawing/2014/main" id="{F6FE9E12-2B23-E15D-5DB4-F620FCA76ADF}"/>
               </a:ext>
             </a:extLst>
           </p:cNvPr>
@@ -7428,8 +7729,8 @@
         </p:nvSpPr>
         <p:spPr>
           <a:xfrm>
-            <a:off x="1261872" y="1828800"/>
-            <a:ext cx="8595360" cy="4351337"/>
+            <a:off x="1261872" y="4382424"/>
+            <a:ext cx="8595360" cy="2065337"/>
           </a:xfrm>
           <a:prstGeom prst="rect">
             <a:avLst/>
@@ -7683,6 +7984,943 @@
             </a:lvl9pPr>
           </a:lstStyle>
           <a:p>
+            <a:r>
+              <a:rPr lang="es-ES" dirty="0"/>
+              <a:t>Se generaron cuatro archivos .</a:t>
+            </a:r>
+            <a:r>
+              <a:rPr lang="es-ES" dirty="0" err="1"/>
+              <a:t>py</a:t>
+            </a:r>
+            <a:r>
+              <a:rPr lang="es-ES" dirty="0"/>
+              <a:t> que contienen el script: atributos, funciones, </a:t>
+            </a:r>
+            <a:r>
+              <a:rPr lang="es-ES" dirty="0" err="1"/>
+              <a:t>sql_queries</a:t>
+            </a:r>
+            <a:r>
+              <a:rPr lang="es-ES" dirty="0"/>
+              <a:t> y </a:t>
+            </a:r>
+            <a:r>
+              <a:rPr lang="es-ES" dirty="0" err="1"/>
+              <a:t>main</a:t>
+            </a:r>
+            <a:r>
+              <a:rPr lang="es-ES" dirty="0"/>
+              <a:t>. Cada uno contiene una parte del pipeline final, de forma de mantener todo ordenado y fácilmente accesible. </a:t>
+            </a:r>
+          </a:p>
+          <a:p>
+            <a:endParaRPr lang="es-ES" dirty="0"/>
+          </a:p>
+        </p:txBody>
+      </p:sp>
+    </p:spTree>
+    <p:extLst>
+      <p:ext uri="{BB962C8B-B14F-4D97-AF65-F5344CB8AC3E}">
+        <p14:creationId xmlns:p14="http://schemas.microsoft.com/office/powerpoint/2010/main" val="2391159054"/>
+      </p:ext>
+    </p:extLst>
+  </p:cSld>
+  <p:clrMapOvr>
+    <a:masterClrMapping/>
+  </p:clrMapOvr>
+</p:sld>
+</file>
+
+<file path=ppt/slides/slide30.xml><?xml version="1.0" encoding="utf-8"?>
+<p:sld xmlns:a="http://schemas.openxmlformats.org/drawingml/2006/main" xmlns:r="http://schemas.openxmlformats.org/officeDocument/2006/relationships" xmlns:p="http://schemas.openxmlformats.org/presentationml/2006/main">
+  <p:cSld>
+    <p:spTree>
+      <p:nvGrpSpPr>
+        <p:cNvPr id="1" name=""/>
+        <p:cNvGrpSpPr/>
+        <p:nvPr/>
+      </p:nvGrpSpPr>
+      <p:grpSpPr>
+        <a:xfrm>
+          <a:off x="0" y="0"/>
+          <a:ext cx="0" cy="0"/>
+          <a:chOff x="0" y="0"/>
+          <a:chExt cx="0" cy="0"/>
+        </a:xfrm>
+      </p:grpSpPr>
+      <p:sp>
+        <p:nvSpPr>
+          <p:cNvPr id="2" name="Título 1">
+            <a:extLst>
+              <a:ext uri="{FF2B5EF4-FFF2-40B4-BE49-F238E27FC236}">
+                <a16:creationId xmlns:a16="http://schemas.microsoft.com/office/drawing/2014/main" id="{100705D7-AC8B-F90D-EAF3-DF827B83F7A0}"/>
+              </a:ext>
+            </a:extLst>
+          </p:cNvPr>
+          <p:cNvSpPr>
+            <a:spLocks noGrp="1"/>
+          </p:cNvSpPr>
+          <p:nvPr>
+            <p:ph type="title"/>
+          </p:nvPr>
+        </p:nvSpPr>
+        <p:spPr/>
+        <p:txBody>
+          <a:bodyPr/>
+          <a:lstStyle/>
+          <a:p>
+            <a:r>
+              <a:rPr lang="es-ES" dirty="0"/>
+              <a:t>Ejercicio extra: análisis de datos</a:t>
+            </a:r>
+          </a:p>
+        </p:txBody>
+      </p:sp>
+    </p:spTree>
+    <p:extLst>
+      <p:ext uri="{BB962C8B-B14F-4D97-AF65-F5344CB8AC3E}">
+        <p14:creationId xmlns:p14="http://schemas.microsoft.com/office/powerpoint/2010/main" val="513099928"/>
+      </p:ext>
+    </p:extLst>
+  </p:cSld>
+  <p:clrMapOvr>
+    <a:masterClrMapping/>
+  </p:clrMapOvr>
+</p:sld>
+</file>
+
+<file path=ppt/slides/slide31.xml><?xml version="1.0" encoding="utf-8"?>
+<p:sld xmlns:a="http://schemas.openxmlformats.org/drawingml/2006/main" xmlns:r="http://schemas.openxmlformats.org/officeDocument/2006/relationships" xmlns:p="http://schemas.openxmlformats.org/presentationml/2006/main">
+  <p:cSld>
+    <p:spTree>
+      <p:nvGrpSpPr>
+        <p:cNvPr id="1" name=""/>
+        <p:cNvGrpSpPr/>
+        <p:nvPr/>
+      </p:nvGrpSpPr>
+      <p:grpSpPr>
+        <a:xfrm>
+          <a:off x="0" y="0"/>
+          <a:ext cx="0" cy="0"/>
+          <a:chOff x="0" y="0"/>
+          <a:chExt cx="0" cy="0"/>
+        </a:xfrm>
+      </p:grpSpPr>
+      <p:sp>
+        <p:nvSpPr>
+          <p:cNvPr id="2" name="Título 1">
+            <a:extLst>
+              <a:ext uri="{FF2B5EF4-FFF2-40B4-BE49-F238E27FC236}">
+                <a16:creationId xmlns:a16="http://schemas.microsoft.com/office/drawing/2014/main" id="{C23F8191-610C-FBCE-4135-9588B9443FB1}"/>
+              </a:ext>
+            </a:extLst>
+          </p:cNvPr>
+          <p:cNvSpPr>
+            <a:spLocks noGrp="1"/>
+          </p:cNvSpPr>
+          <p:nvPr>
+            <p:ph type="title"/>
+          </p:nvPr>
+        </p:nvSpPr>
+        <p:spPr/>
+        <p:txBody>
+          <a:bodyPr/>
+          <a:lstStyle/>
+          <a:p>
+            <a:r>
+              <a:rPr lang="es-ES" dirty="0" err="1"/>
+              <a:t>Queries</a:t>
+            </a:r>
+            <a:r>
+              <a:rPr lang="es-ES" dirty="0"/>
+              <a:t> y resultados</a:t>
+            </a:r>
+          </a:p>
+        </p:txBody>
+      </p:sp>
+      <p:sp>
+        <p:nvSpPr>
+          <p:cNvPr id="3" name="Marcador de contenido 2">
+            <a:extLst>
+              <a:ext uri="{FF2B5EF4-FFF2-40B4-BE49-F238E27FC236}">
+                <a16:creationId xmlns:a16="http://schemas.microsoft.com/office/drawing/2014/main" id="{DCCA2529-9732-C125-1C9D-912924D78857}"/>
+              </a:ext>
+            </a:extLst>
+          </p:cNvPr>
+          <p:cNvSpPr>
+            <a:spLocks noGrp="1"/>
+          </p:cNvSpPr>
+          <p:nvPr>
+            <p:ph idx="1"/>
+          </p:nvPr>
+        </p:nvSpPr>
+        <p:spPr/>
+        <p:txBody>
+          <a:bodyPr/>
+          <a:lstStyle/>
+          <a:p>
+            <a:r>
+              <a:rPr lang="es-ES" dirty="0"/>
+              <a:t>Cuál es el ranking de supermercados más frecuentes?</a:t>
+            </a:r>
+          </a:p>
+        </p:txBody>
+      </p:sp>
+      <p:pic>
+        <p:nvPicPr>
+          <p:cNvPr id="5" name="Imagen 4" descr="Tabla&#10;&#10;Descripción generada automáticamente">
+            <a:extLst>
+              <a:ext uri="{FF2B5EF4-FFF2-40B4-BE49-F238E27FC236}">
+                <a16:creationId xmlns:a16="http://schemas.microsoft.com/office/drawing/2014/main" id="{822D906C-27F5-7CA5-0832-FE43AC148F5C}"/>
+              </a:ext>
+            </a:extLst>
+          </p:cNvPr>
+          <p:cNvPicPr>
+            <a:picLocks noChangeAspect="1"/>
+          </p:cNvPicPr>
+          <p:nvPr/>
+        </p:nvPicPr>
+        <p:blipFill>
+          <a:blip r:embed="rId2">
+            <a:extLst>
+              <a:ext uri="{28A0092B-C50C-407E-A947-70E740481C1C}">
+                <a14:useLocalDpi xmlns:a14="http://schemas.microsoft.com/office/drawing/2010/main" val="0"/>
+              </a:ext>
+            </a:extLst>
+          </a:blip>
+          <a:stretch>
+            <a:fillRect/>
+          </a:stretch>
+        </p:blipFill>
+        <p:spPr>
+          <a:xfrm>
+            <a:off x="3979163" y="2457699"/>
+            <a:ext cx="4233673" cy="3722438"/>
+          </a:xfrm>
+          <a:prstGeom prst="rect">
+            <a:avLst/>
+          </a:prstGeom>
+          <a:ln w="25400">
+            <a:solidFill>
+              <a:schemeClr val="tx1"/>
+            </a:solidFill>
+          </a:ln>
+        </p:spPr>
+      </p:pic>
+    </p:spTree>
+    <p:extLst>
+      <p:ext uri="{BB962C8B-B14F-4D97-AF65-F5344CB8AC3E}">
+        <p14:creationId xmlns:p14="http://schemas.microsoft.com/office/powerpoint/2010/main" val="2169269336"/>
+      </p:ext>
+    </p:extLst>
+  </p:cSld>
+  <p:clrMapOvr>
+    <a:masterClrMapping/>
+  </p:clrMapOvr>
+</p:sld>
+</file>
+
+<file path=ppt/slides/slide32.xml><?xml version="1.0" encoding="utf-8"?>
+<p:sld xmlns:a="http://schemas.openxmlformats.org/drawingml/2006/main" xmlns:r="http://schemas.openxmlformats.org/officeDocument/2006/relationships" xmlns:p="http://schemas.openxmlformats.org/presentationml/2006/main">
+  <p:cSld>
+    <p:spTree>
+      <p:nvGrpSpPr>
+        <p:cNvPr id="1" name=""/>
+        <p:cNvGrpSpPr/>
+        <p:nvPr/>
+      </p:nvGrpSpPr>
+      <p:grpSpPr>
+        <a:xfrm>
+          <a:off x="0" y="0"/>
+          <a:ext cx="0" cy="0"/>
+          <a:chOff x="0" y="0"/>
+          <a:chExt cx="0" cy="0"/>
+        </a:xfrm>
+      </p:grpSpPr>
+      <p:sp>
+        <p:nvSpPr>
+          <p:cNvPr id="2" name="Título 1">
+            <a:extLst>
+              <a:ext uri="{FF2B5EF4-FFF2-40B4-BE49-F238E27FC236}">
+                <a16:creationId xmlns:a16="http://schemas.microsoft.com/office/drawing/2014/main" id="{C23F8191-610C-FBCE-4135-9588B9443FB1}"/>
+              </a:ext>
+            </a:extLst>
+          </p:cNvPr>
+          <p:cNvSpPr>
+            <a:spLocks noGrp="1"/>
+          </p:cNvSpPr>
+          <p:nvPr>
+            <p:ph type="title"/>
+          </p:nvPr>
+        </p:nvSpPr>
+        <p:spPr/>
+        <p:txBody>
+          <a:bodyPr/>
+          <a:lstStyle/>
+          <a:p>
+            <a:r>
+              <a:rPr lang="es-ES" dirty="0" err="1"/>
+              <a:t>Queries</a:t>
+            </a:r>
+            <a:r>
+              <a:rPr lang="es-ES" dirty="0"/>
+              <a:t> y resultados</a:t>
+            </a:r>
+          </a:p>
+        </p:txBody>
+      </p:sp>
+      <p:sp>
+        <p:nvSpPr>
+          <p:cNvPr id="3" name="Marcador de contenido 2">
+            <a:extLst>
+              <a:ext uri="{FF2B5EF4-FFF2-40B4-BE49-F238E27FC236}">
+                <a16:creationId xmlns:a16="http://schemas.microsoft.com/office/drawing/2014/main" id="{DCCA2529-9732-C125-1C9D-912924D78857}"/>
+              </a:ext>
+            </a:extLst>
+          </p:cNvPr>
+          <p:cNvSpPr>
+            <a:spLocks noGrp="1"/>
+          </p:cNvSpPr>
+          <p:nvPr>
+            <p:ph idx="1"/>
+          </p:nvPr>
+        </p:nvSpPr>
+        <p:spPr/>
+        <p:txBody>
+          <a:bodyPr/>
+          <a:lstStyle/>
+          <a:p>
+            <a:r>
+              <a:rPr lang="es-ES" dirty="0"/>
+              <a:t>Cual es la canasta básica?</a:t>
+            </a:r>
+          </a:p>
+        </p:txBody>
+      </p:sp>
+      <p:pic>
+        <p:nvPicPr>
+          <p:cNvPr id="6" name="Imagen 5" descr="Tabla&#10;&#10;Descripción generada automáticamente">
+            <a:extLst>
+              <a:ext uri="{FF2B5EF4-FFF2-40B4-BE49-F238E27FC236}">
+                <a16:creationId xmlns:a16="http://schemas.microsoft.com/office/drawing/2014/main" id="{F4226F74-0D63-E396-F9C0-A219E1E096B7}"/>
+              </a:ext>
+            </a:extLst>
+          </p:cNvPr>
+          <p:cNvPicPr>
+            <a:picLocks noChangeAspect="1"/>
+          </p:cNvPicPr>
+          <p:nvPr/>
+        </p:nvPicPr>
+        <p:blipFill>
+          <a:blip r:embed="rId2">
+            <a:extLst>
+              <a:ext uri="{28A0092B-C50C-407E-A947-70E740481C1C}">
+                <a14:useLocalDpi xmlns:a14="http://schemas.microsoft.com/office/drawing/2010/main" val="0"/>
+              </a:ext>
+            </a:extLst>
+          </a:blip>
+          <a:stretch>
+            <a:fillRect/>
+          </a:stretch>
+        </p:blipFill>
+        <p:spPr>
+          <a:xfrm>
+            <a:off x="3689603" y="2336877"/>
+            <a:ext cx="4812794" cy="3843260"/>
+          </a:xfrm>
+          <a:prstGeom prst="rect">
+            <a:avLst/>
+          </a:prstGeom>
+          <a:ln w="25400">
+            <a:solidFill>
+              <a:schemeClr val="tx1"/>
+            </a:solidFill>
+          </a:ln>
+        </p:spPr>
+      </p:pic>
+    </p:spTree>
+    <p:extLst>
+      <p:ext uri="{BB962C8B-B14F-4D97-AF65-F5344CB8AC3E}">
+        <p14:creationId xmlns:p14="http://schemas.microsoft.com/office/powerpoint/2010/main" val="4023111943"/>
+      </p:ext>
+    </p:extLst>
+  </p:cSld>
+  <p:clrMapOvr>
+    <a:masterClrMapping/>
+  </p:clrMapOvr>
+</p:sld>
+</file>
+
+<file path=ppt/slides/slide33.xml><?xml version="1.0" encoding="utf-8"?>
+<p:sld xmlns:a="http://schemas.openxmlformats.org/drawingml/2006/main" xmlns:r="http://schemas.openxmlformats.org/officeDocument/2006/relationships" xmlns:p="http://schemas.openxmlformats.org/presentationml/2006/main">
+  <p:cSld>
+    <p:spTree>
+      <p:nvGrpSpPr>
+        <p:cNvPr id="1" name=""/>
+        <p:cNvGrpSpPr/>
+        <p:nvPr/>
+      </p:nvGrpSpPr>
+      <p:grpSpPr>
+        <a:xfrm>
+          <a:off x="0" y="0"/>
+          <a:ext cx="0" cy="0"/>
+          <a:chOff x="0" y="0"/>
+          <a:chExt cx="0" cy="0"/>
+        </a:xfrm>
+      </p:grpSpPr>
+      <p:sp>
+        <p:nvSpPr>
+          <p:cNvPr id="2" name="Título 1">
+            <a:extLst>
+              <a:ext uri="{FF2B5EF4-FFF2-40B4-BE49-F238E27FC236}">
+                <a16:creationId xmlns:a16="http://schemas.microsoft.com/office/drawing/2014/main" id="{C23F8191-610C-FBCE-4135-9588B9443FB1}"/>
+              </a:ext>
+            </a:extLst>
+          </p:cNvPr>
+          <p:cNvSpPr>
+            <a:spLocks noGrp="1"/>
+          </p:cNvSpPr>
+          <p:nvPr>
+            <p:ph type="title"/>
+          </p:nvPr>
+        </p:nvSpPr>
+        <p:spPr/>
+        <p:txBody>
+          <a:bodyPr/>
+          <a:lstStyle/>
+          <a:p>
+            <a:r>
+              <a:rPr lang="es-ES" dirty="0" err="1"/>
+              <a:t>Queries</a:t>
+            </a:r>
+            <a:r>
+              <a:rPr lang="es-ES" dirty="0"/>
+              <a:t> y resultados</a:t>
+            </a:r>
+          </a:p>
+        </p:txBody>
+      </p:sp>
+      <p:sp>
+        <p:nvSpPr>
+          <p:cNvPr id="3" name="Marcador de contenido 2">
+            <a:extLst>
+              <a:ext uri="{FF2B5EF4-FFF2-40B4-BE49-F238E27FC236}">
+                <a16:creationId xmlns:a16="http://schemas.microsoft.com/office/drawing/2014/main" id="{DCCA2529-9732-C125-1C9D-912924D78857}"/>
+              </a:ext>
+            </a:extLst>
+          </p:cNvPr>
+          <p:cNvSpPr>
+            <a:spLocks noGrp="1"/>
+          </p:cNvSpPr>
+          <p:nvPr>
+            <p:ph idx="1"/>
+          </p:nvPr>
+        </p:nvSpPr>
+        <p:spPr/>
+        <p:txBody>
+          <a:bodyPr/>
+          <a:lstStyle/>
+          <a:p>
+            <a:r>
+              <a:rPr lang="es-ES" dirty="0"/>
+              <a:t>Cuál es el método de pago favorito por rango de edad?</a:t>
+            </a:r>
+          </a:p>
+        </p:txBody>
+      </p:sp>
+      <p:pic>
+        <p:nvPicPr>
+          <p:cNvPr id="5" name="Imagen 4" descr="Interfaz de usuario gráfica&#10;&#10;Descripción generada automáticamente con confianza media">
+            <a:extLst>
+              <a:ext uri="{FF2B5EF4-FFF2-40B4-BE49-F238E27FC236}">
+                <a16:creationId xmlns:a16="http://schemas.microsoft.com/office/drawing/2014/main" id="{B1AB34FA-AF11-65BE-0D67-199DF5D16C0A}"/>
+              </a:ext>
+            </a:extLst>
+          </p:cNvPr>
+          <p:cNvPicPr>
+            <a:picLocks noChangeAspect="1"/>
+          </p:cNvPicPr>
+          <p:nvPr/>
+        </p:nvPicPr>
+        <p:blipFill>
+          <a:blip r:embed="rId2">
+            <a:extLst>
+              <a:ext uri="{28A0092B-C50C-407E-A947-70E740481C1C}">
+                <a14:useLocalDpi xmlns:a14="http://schemas.microsoft.com/office/drawing/2010/main" val="0"/>
+              </a:ext>
+            </a:extLst>
+          </a:blip>
+          <a:stretch>
+            <a:fillRect/>
+          </a:stretch>
+        </p:blipFill>
+        <p:spPr>
+          <a:xfrm>
+            <a:off x="3468814" y="2652521"/>
+            <a:ext cx="5254371" cy="2535260"/>
+          </a:xfrm>
+          <a:prstGeom prst="rect">
+            <a:avLst/>
+          </a:prstGeom>
+          <a:ln w="25400">
+            <a:solidFill>
+              <a:schemeClr val="tx1"/>
+            </a:solidFill>
+          </a:ln>
+        </p:spPr>
+      </p:pic>
+    </p:spTree>
+    <p:extLst>
+      <p:ext uri="{BB962C8B-B14F-4D97-AF65-F5344CB8AC3E}">
+        <p14:creationId xmlns:p14="http://schemas.microsoft.com/office/powerpoint/2010/main" val="842287370"/>
+      </p:ext>
+    </p:extLst>
+  </p:cSld>
+  <p:clrMapOvr>
+    <a:masterClrMapping/>
+  </p:clrMapOvr>
+</p:sld>
+</file>
+
+<file path=ppt/slides/slide34.xml><?xml version="1.0" encoding="utf-8"?>
+<p:sld xmlns:a="http://schemas.openxmlformats.org/drawingml/2006/main" xmlns:r="http://schemas.openxmlformats.org/officeDocument/2006/relationships" xmlns:p="http://schemas.openxmlformats.org/presentationml/2006/main">
+  <p:cSld>
+    <p:spTree>
+      <p:nvGrpSpPr>
+        <p:cNvPr id="1" name=""/>
+        <p:cNvGrpSpPr/>
+        <p:nvPr/>
+      </p:nvGrpSpPr>
+      <p:grpSpPr>
+        <a:xfrm>
+          <a:off x="0" y="0"/>
+          <a:ext cx="0" cy="0"/>
+          <a:chOff x="0" y="0"/>
+          <a:chExt cx="0" cy="0"/>
+        </a:xfrm>
+      </p:grpSpPr>
+    </p:spTree>
+    <p:extLst>
+      <p:ext uri="{BB962C8B-B14F-4D97-AF65-F5344CB8AC3E}">
+        <p14:creationId xmlns:p14="http://schemas.microsoft.com/office/powerpoint/2010/main" val="4268109902"/>
+      </p:ext>
+    </p:extLst>
+  </p:cSld>
+  <p:clrMapOvr>
+    <a:masterClrMapping/>
+  </p:clrMapOvr>
+</p:sld>
+</file>
+
+<file path=ppt/slides/slide4.xml><?xml version="1.0" encoding="utf-8"?>
+<p:sld xmlns:a="http://schemas.openxmlformats.org/drawingml/2006/main" xmlns:r="http://schemas.openxmlformats.org/officeDocument/2006/relationships" xmlns:p="http://schemas.openxmlformats.org/presentationml/2006/main">
+  <p:cSld>
+    <p:spTree>
+      <p:nvGrpSpPr>
+        <p:cNvPr id="1" name=""/>
+        <p:cNvGrpSpPr/>
+        <p:nvPr/>
+      </p:nvGrpSpPr>
+      <p:grpSpPr>
+        <a:xfrm>
+          <a:off x="0" y="0"/>
+          <a:ext cx="0" cy="0"/>
+          <a:chOff x="0" y="0"/>
+          <a:chExt cx="0" cy="0"/>
+        </a:xfrm>
+      </p:grpSpPr>
+      <p:sp>
+        <p:nvSpPr>
+          <p:cNvPr id="2" name="Título 1">
+            <a:extLst>
+              <a:ext uri="{FF2B5EF4-FFF2-40B4-BE49-F238E27FC236}">
+                <a16:creationId xmlns:a16="http://schemas.microsoft.com/office/drawing/2014/main" id="{E839F22C-FA05-61A3-1CCB-3567A618B57D}"/>
+              </a:ext>
+            </a:extLst>
+          </p:cNvPr>
+          <p:cNvSpPr>
+            <a:spLocks noGrp="1"/>
+          </p:cNvSpPr>
+          <p:nvPr>
+            <p:ph type="title"/>
+          </p:nvPr>
+        </p:nvSpPr>
+        <p:spPr/>
+        <p:txBody>
+          <a:bodyPr/>
+          <a:lstStyle/>
+          <a:p>
+            <a:r>
+              <a:rPr lang="es-ES" dirty="0"/>
+              <a:t>Obtención y preparación de los datos</a:t>
+            </a:r>
+          </a:p>
+        </p:txBody>
+      </p:sp>
+    </p:spTree>
+    <p:extLst>
+      <p:ext uri="{BB962C8B-B14F-4D97-AF65-F5344CB8AC3E}">
+        <p14:creationId xmlns:p14="http://schemas.microsoft.com/office/powerpoint/2010/main" val="3641053661"/>
+      </p:ext>
+    </p:extLst>
+  </p:cSld>
+  <p:clrMapOvr>
+    <a:masterClrMapping/>
+  </p:clrMapOvr>
+</p:sld>
+</file>
+
+<file path=ppt/slides/slide5.xml><?xml version="1.0" encoding="utf-8"?>
+<p:sld xmlns:a="http://schemas.openxmlformats.org/drawingml/2006/main" xmlns:r="http://schemas.openxmlformats.org/officeDocument/2006/relationships" xmlns:p="http://schemas.openxmlformats.org/presentationml/2006/main">
+  <p:cSld>
+    <p:spTree>
+      <p:nvGrpSpPr>
+        <p:cNvPr id="1" name=""/>
+        <p:cNvGrpSpPr/>
+        <p:nvPr/>
+      </p:nvGrpSpPr>
+      <p:grpSpPr>
+        <a:xfrm>
+          <a:off x="0" y="0"/>
+          <a:ext cx="0" cy="0"/>
+          <a:chOff x="0" y="0"/>
+          <a:chExt cx="0" cy="0"/>
+        </a:xfrm>
+      </p:grpSpPr>
+      <p:sp>
+        <p:nvSpPr>
+          <p:cNvPr id="2" name="Título 1">
+            <a:extLst>
+              <a:ext uri="{FF2B5EF4-FFF2-40B4-BE49-F238E27FC236}">
+                <a16:creationId xmlns:a16="http://schemas.microsoft.com/office/drawing/2014/main" id="{12F4CC32-138E-33C8-987D-3B0CD4EF6728}"/>
+              </a:ext>
+            </a:extLst>
+          </p:cNvPr>
+          <p:cNvSpPr>
+            <a:spLocks noGrp="1"/>
+          </p:cNvSpPr>
+          <p:nvPr>
+            <p:ph type="title"/>
+          </p:nvPr>
+        </p:nvSpPr>
+        <p:spPr/>
+        <p:txBody>
+          <a:bodyPr/>
+          <a:lstStyle/>
+          <a:p>
+            <a:r>
+              <a:rPr lang="es-ES" dirty="0"/>
+              <a:t>Carga y Limpieza de los datos:</a:t>
+            </a:r>
+          </a:p>
+        </p:txBody>
+      </p:sp>
+      <p:pic>
+        <p:nvPicPr>
+          <p:cNvPr id="5" name="Marcador de contenido 4" descr="Texto&#10;&#10;Descripción generada automáticamente">
+            <a:extLst>
+              <a:ext uri="{FF2B5EF4-FFF2-40B4-BE49-F238E27FC236}">
+                <a16:creationId xmlns:a16="http://schemas.microsoft.com/office/drawing/2014/main" id="{4185BADC-63C5-2716-B1EB-DEF763CDCE50}"/>
+              </a:ext>
+            </a:extLst>
+          </p:cNvPr>
+          <p:cNvPicPr>
+            <a:picLocks noGrp="1" noChangeAspect="1"/>
+          </p:cNvPicPr>
+          <p:nvPr>
+            <p:ph idx="1"/>
+          </p:nvPr>
+        </p:nvPicPr>
+        <p:blipFill>
+          <a:blip r:embed="rId2">
+            <a:extLst>
+              <a:ext uri="{28A0092B-C50C-407E-A947-70E740481C1C}">
+                <a14:useLocalDpi xmlns:a14="http://schemas.microsoft.com/office/drawing/2010/main" val="0"/>
+              </a:ext>
+            </a:extLst>
+          </a:blip>
+          <a:stretch>
+            <a:fillRect/>
+          </a:stretch>
+        </p:blipFill>
+        <p:spPr>
+          <a:xfrm>
+            <a:off x="2489232" y="4622599"/>
+            <a:ext cx="6140638" cy="1557538"/>
+          </a:xfrm>
+        </p:spPr>
+      </p:pic>
+      <p:sp>
+        <p:nvSpPr>
+          <p:cNvPr id="6" name="Marcador de contenido 2">
+            <a:extLst>
+              <a:ext uri="{FF2B5EF4-FFF2-40B4-BE49-F238E27FC236}">
+                <a16:creationId xmlns:a16="http://schemas.microsoft.com/office/drawing/2014/main" id="{12D82559-AED9-CA79-9923-F1F7E8FB5FE0}"/>
+              </a:ext>
+            </a:extLst>
+          </p:cNvPr>
+          <p:cNvSpPr txBox="1">
+            <a:spLocks/>
+          </p:cNvSpPr>
+          <p:nvPr/>
+        </p:nvSpPr>
+        <p:spPr>
+          <a:xfrm>
+            <a:off x="1261872" y="1828800"/>
+            <a:ext cx="8595360" cy="4351337"/>
+          </a:xfrm>
+          <a:prstGeom prst="rect">
+            <a:avLst/>
+          </a:prstGeom>
+        </p:spPr>
+        <p:txBody>
+          <a:bodyPr vert="horz" lIns="91440" tIns="45720" rIns="91440" bIns="45720" rtlCol="0">
+            <a:normAutofit/>
+          </a:bodyPr>
+          <a:lstStyle>
+            <a:lvl1pPr marL="182880" indent="-182880" algn="l" defTabSz="914400" rtl="0" eaLnBrk="1" latinLnBrk="0" hangingPunct="1">
+              <a:lnSpc>
+                <a:spcPct val="95000"/>
+              </a:lnSpc>
+              <a:spcBef>
+                <a:spcPts val="1400"/>
+              </a:spcBef>
+              <a:spcAft>
+                <a:spcPts val="200"/>
+              </a:spcAft>
+              <a:buClr>
+                <a:schemeClr val="accent1"/>
+              </a:buClr>
+              <a:buSzPct val="80000"/>
+              <a:buFont typeface="Arial" pitchFamily="34" charset="0"/>
+              <a:buChar char="•"/>
+              <a:defRPr sz="1800" kern="1200" spc="10" baseline="0">
+                <a:solidFill>
+                  <a:schemeClr val="tx1"/>
+                </a:solidFill>
+                <a:latin typeface="+mn-lt"/>
+                <a:ea typeface="+mn-ea"/>
+                <a:cs typeface="+mn-cs"/>
+              </a:defRPr>
+            </a:lvl1pPr>
+            <a:lvl2pPr marL="457200" indent="-182880" algn="l" defTabSz="914400" rtl="0" eaLnBrk="1" latinLnBrk="0" hangingPunct="1">
+              <a:lnSpc>
+                <a:spcPct val="90000"/>
+              </a:lnSpc>
+              <a:spcBef>
+                <a:spcPts val="300"/>
+              </a:spcBef>
+              <a:spcAft>
+                <a:spcPts val="300"/>
+              </a:spcAft>
+              <a:buClr>
+                <a:schemeClr val="accent1"/>
+              </a:buClr>
+              <a:buFont typeface="Wingdings 2" pitchFamily="18" charset="2"/>
+              <a:buChar char=""/>
+              <a:defRPr sz="1600" kern="1200">
+                <a:solidFill>
+                  <a:schemeClr val="tx1">
+                    <a:lumMod val="85000"/>
+                    <a:lumOff val="15000"/>
+                  </a:schemeClr>
+                </a:solidFill>
+                <a:latin typeface="+mn-lt"/>
+                <a:ea typeface="+mn-ea"/>
+                <a:cs typeface="+mn-cs"/>
+              </a:defRPr>
+            </a:lvl2pPr>
+            <a:lvl3pPr marL="731520" indent="-182880" algn="l" defTabSz="914400" rtl="0" eaLnBrk="1" latinLnBrk="0" hangingPunct="1">
+              <a:lnSpc>
+                <a:spcPct val="90000"/>
+              </a:lnSpc>
+              <a:spcBef>
+                <a:spcPts val="300"/>
+              </a:spcBef>
+              <a:spcAft>
+                <a:spcPts val="300"/>
+              </a:spcAft>
+              <a:buClr>
+                <a:schemeClr val="accent1"/>
+              </a:buClr>
+              <a:buFont typeface="Wingdings 2" pitchFamily="18" charset="2"/>
+              <a:buChar char=""/>
+              <a:defRPr sz="1400" kern="1200">
+                <a:solidFill>
+                  <a:schemeClr val="tx1">
+                    <a:lumMod val="85000"/>
+                    <a:lumOff val="15000"/>
+                  </a:schemeClr>
+                </a:solidFill>
+                <a:latin typeface="+mn-lt"/>
+                <a:ea typeface="+mn-ea"/>
+                <a:cs typeface="+mn-cs"/>
+              </a:defRPr>
+            </a:lvl3pPr>
+            <a:lvl4pPr marL="1005840" indent="-182880" algn="l" defTabSz="914400" rtl="0" eaLnBrk="1" latinLnBrk="0" hangingPunct="1">
+              <a:lnSpc>
+                <a:spcPct val="90000"/>
+              </a:lnSpc>
+              <a:spcBef>
+                <a:spcPts val="300"/>
+              </a:spcBef>
+              <a:spcAft>
+                <a:spcPts val="300"/>
+              </a:spcAft>
+              <a:buClr>
+                <a:schemeClr val="accent1"/>
+              </a:buClr>
+              <a:buFont typeface="Wingdings 2" pitchFamily="18" charset="2"/>
+              <a:buChar char=""/>
+              <a:defRPr sz="1400" kern="1200">
+                <a:solidFill>
+                  <a:schemeClr val="tx1">
+                    <a:lumMod val="85000"/>
+                    <a:lumOff val="15000"/>
+                  </a:schemeClr>
+                </a:solidFill>
+                <a:latin typeface="+mn-lt"/>
+                <a:ea typeface="+mn-ea"/>
+                <a:cs typeface="+mn-cs"/>
+              </a:defRPr>
+            </a:lvl4pPr>
+            <a:lvl5pPr marL="1280160" indent="-182880" algn="l" defTabSz="914400" rtl="0" eaLnBrk="1" latinLnBrk="0" hangingPunct="1">
+              <a:lnSpc>
+                <a:spcPct val="90000"/>
+              </a:lnSpc>
+              <a:spcBef>
+                <a:spcPts val="300"/>
+              </a:spcBef>
+              <a:spcAft>
+                <a:spcPts val="300"/>
+              </a:spcAft>
+              <a:buClr>
+                <a:schemeClr val="accent1"/>
+              </a:buClr>
+              <a:buFont typeface="Wingdings 2" pitchFamily="18" charset="2"/>
+              <a:buChar char=""/>
+              <a:defRPr sz="1400" kern="1200">
+                <a:solidFill>
+                  <a:schemeClr val="tx1">
+                    <a:lumMod val="85000"/>
+                    <a:lumOff val="15000"/>
+                  </a:schemeClr>
+                </a:solidFill>
+                <a:latin typeface="+mn-lt"/>
+                <a:ea typeface="+mn-ea"/>
+                <a:cs typeface="+mn-cs"/>
+              </a:defRPr>
+            </a:lvl5pPr>
+            <a:lvl6pPr marL="1600000" indent="-228600" algn="l" defTabSz="914400" rtl="0" eaLnBrk="1" latinLnBrk="0" hangingPunct="1">
+              <a:lnSpc>
+                <a:spcPct val="90000"/>
+              </a:lnSpc>
+              <a:spcBef>
+                <a:spcPts val="300"/>
+              </a:spcBef>
+              <a:spcAft>
+                <a:spcPts val="300"/>
+              </a:spcAft>
+              <a:buClr>
+                <a:schemeClr val="accent1"/>
+              </a:buClr>
+              <a:buFont typeface="Wingdings 2" pitchFamily="18" charset="2"/>
+              <a:buChar char=""/>
+              <a:defRPr sz="1400" kern="1200">
+                <a:solidFill>
+                  <a:schemeClr val="tx1">
+                    <a:lumMod val="85000"/>
+                    <a:lumOff val="15000"/>
+                  </a:schemeClr>
+                </a:solidFill>
+                <a:latin typeface="+mn-lt"/>
+                <a:ea typeface="+mn-ea"/>
+                <a:cs typeface="+mn-cs"/>
+              </a:defRPr>
+            </a:lvl6pPr>
+            <a:lvl7pPr marL="1900000" indent="-228600" algn="l" defTabSz="914400" rtl="0" eaLnBrk="1" latinLnBrk="0" hangingPunct="1">
+              <a:lnSpc>
+                <a:spcPct val="90000"/>
+              </a:lnSpc>
+              <a:spcBef>
+                <a:spcPts val="300"/>
+              </a:spcBef>
+              <a:spcAft>
+                <a:spcPts val="300"/>
+              </a:spcAft>
+              <a:buClr>
+                <a:schemeClr val="accent1"/>
+              </a:buClr>
+              <a:buFont typeface="Wingdings 2" pitchFamily="18" charset="2"/>
+              <a:buChar char=""/>
+              <a:defRPr sz="1400" kern="1200">
+                <a:solidFill>
+                  <a:schemeClr val="tx1">
+                    <a:lumMod val="85000"/>
+                    <a:lumOff val="15000"/>
+                  </a:schemeClr>
+                </a:solidFill>
+                <a:latin typeface="+mn-lt"/>
+                <a:ea typeface="+mn-ea"/>
+                <a:cs typeface="+mn-cs"/>
+              </a:defRPr>
+            </a:lvl7pPr>
+            <a:lvl8pPr marL="2200000" indent="-228600" algn="l" defTabSz="914400" rtl="0" eaLnBrk="1" latinLnBrk="0" hangingPunct="1">
+              <a:lnSpc>
+                <a:spcPct val="90000"/>
+              </a:lnSpc>
+              <a:spcBef>
+                <a:spcPts val="300"/>
+              </a:spcBef>
+              <a:spcAft>
+                <a:spcPts val="300"/>
+              </a:spcAft>
+              <a:buClr>
+                <a:schemeClr val="accent1"/>
+              </a:buClr>
+              <a:buFont typeface="Wingdings 2" pitchFamily="18" charset="2"/>
+              <a:buChar char=""/>
+              <a:defRPr sz="1400" kern="1200">
+                <a:solidFill>
+                  <a:schemeClr val="tx1">
+                    <a:lumMod val="85000"/>
+                    <a:lumOff val="15000"/>
+                  </a:schemeClr>
+                </a:solidFill>
+                <a:latin typeface="+mn-lt"/>
+                <a:ea typeface="+mn-ea"/>
+                <a:cs typeface="+mn-cs"/>
+              </a:defRPr>
+            </a:lvl8pPr>
+            <a:lvl9pPr marL="2500000" indent="-228600" algn="l" defTabSz="914400" rtl="0" eaLnBrk="1" latinLnBrk="0" hangingPunct="1">
+              <a:lnSpc>
+                <a:spcPct val="90000"/>
+              </a:lnSpc>
+              <a:spcBef>
+                <a:spcPts val="300"/>
+              </a:spcBef>
+              <a:spcAft>
+                <a:spcPts val="300"/>
+              </a:spcAft>
+              <a:buClr>
+                <a:schemeClr val="accent1"/>
+              </a:buClr>
+              <a:buFont typeface="Wingdings 2" pitchFamily="18" charset="2"/>
+              <a:buChar char=""/>
+              <a:defRPr sz="1400" kern="1200">
+                <a:solidFill>
+                  <a:schemeClr val="tx1">
+                    <a:lumMod val="85000"/>
+                    <a:lumOff val="15000"/>
+                  </a:schemeClr>
+                </a:solidFill>
+                <a:latin typeface="+mn-lt"/>
+                <a:ea typeface="+mn-ea"/>
+                <a:cs typeface="+mn-cs"/>
+              </a:defRPr>
+            </a:lvl9pPr>
+          </a:lstStyle>
+          <a:p>
             <a:pPr marL="0" indent="0">
               <a:buNone/>
             </a:pPr>
@@ -7801,7 +9039,7 @@
 </p:sld>
 </file>
 
-<file path=ppt/slides/slide5.xml><?xml version="1.0" encoding="utf-8"?>
+<file path=ppt/slides/slide6.xml><?xml version="1.0" encoding="utf-8"?>
 <p:sld xmlns:a="http://schemas.openxmlformats.org/drawingml/2006/main" xmlns:r="http://schemas.openxmlformats.org/officeDocument/2006/relationships" xmlns:p="http://schemas.openxmlformats.org/presentationml/2006/main">
   <p:cSld>
     <p:spTree>
@@ -7894,7 +9132,7 @@
 </p:sld>
 </file>
 
-<file path=ppt/slides/slide6.xml><?xml version="1.0" encoding="utf-8"?>
+<file path=ppt/slides/slide7.xml><?xml version="1.0" encoding="utf-8"?>
 <p:sld xmlns:a="http://schemas.openxmlformats.org/drawingml/2006/main" xmlns:r="http://schemas.openxmlformats.org/officeDocument/2006/relationships" xmlns:p="http://schemas.openxmlformats.org/presentationml/2006/main">
   <p:cSld>
     <p:spTree>
@@ -8090,7 +9328,7 @@
 </p:sld>
 </file>
 
-<file path=ppt/slides/slide7.xml><?xml version="1.0" encoding="utf-8"?>
+<file path=ppt/slides/slide8.xml><?xml version="1.0" encoding="utf-8"?>
 <p:sld xmlns:a="http://schemas.openxmlformats.org/drawingml/2006/main" xmlns:r="http://schemas.openxmlformats.org/officeDocument/2006/relationships" xmlns:p="http://schemas.openxmlformats.org/presentationml/2006/main">
   <p:cSld>
     <p:spTree>
@@ -8540,7 +9778,7 @@
 </p:sld>
 </file>
 
-<file path=ppt/slides/slide8.xml><?xml version="1.0" encoding="utf-8"?>
+<file path=ppt/slides/slide9.xml><?xml version="1.0" encoding="utf-8"?>
 <p:sld xmlns:a="http://schemas.openxmlformats.org/drawingml/2006/main" xmlns:r="http://schemas.openxmlformats.org/officeDocument/2006/relationships" xmlns:p="http://schemas.openxmlformats.org/presentationml/2006/main">
   <p:cSld>
     <p:spTree>
@@ -9215,100 +10453,6 @@
     <p:extLst>
       <p:ext uri="{BB962C8B-B14F-4D97-AF65-F5344CB8AC3E}">
         <p14:creationId xmlns:p14="http://schemas.microsoft.com/office/powerpoint/2010/main" val="3318631904"/>
-      </p:ext>
-    </p:extLst>
-  </p:cSld>
-  <p:clrMapOvr>
-    <a:masterClrMapping/>
-  </p:clrMapOvr>
-</p:sld>
-</file>
-
-<file path=ppt/slides/slide9.xml><?xml version="1.0" encoding="utf-8"?>
-<p:sld xmlns:a="http://schemas.openxmlformats.org/drawingml/2006/main" xmlns:r="http://schemas.openxmlformats.org/officeDocument/2006/relationships" xmlns:p="http://schemas.openxmlformats.org/presentationml/2006/main">
-  <p:cSld>
-    <p:spTree>
-      <p:nvGrpSpPr>
-        <p:cNvPr id="1" name=""/>
-        <p:cNvGrpSpPr/>
-        <p:nvPr/>
-      </p:nvGrpSpPr>
-      <p:grpSpPr>
-        <a:xfrm>
-          <a:off x="0" y="0"/>
-          <a:ext cx="0" cy="0"/>
-          <a:chOff x="0" y="0"/>
-          <a:chExt cx="0" cy="0"/>
-        </a:xfrm>
-      </p:grpSpPr>
-      <p:sp>
-        <p:nvSpPr>
-          <p:cNvPr id="2" name="Título 1">
-            <a:extLst>
-              <a:ext uri="{FF2B5EF4-FFF2-40B4-BE49-F238E27FC236}">
-                <a16:creationId xmlns:a16="http://schemas.microsoft.com/office/drawing/2014/main" id="{B1A12FDB-4206-B906-A1A8-1EE7C92A66E4}"/>
-              </a:ext>
-            </a:extLst>
-          </p:cNvPr>
-          <p:cNvSpPr>
-            <a:spLocks noGrp="1"/>
-          </p:cNvSpPr>
-          <p:nvPr>
-            <p:ph type="title"/>
-          </p:nvPr>
-        </p:nvSpPr>
-        <p:spPr/>
-        <p:txBody>
-          <a:bodyPr/>
-          <a:lstStyle/>
-          <a:p>
-            <a:r>
-              <a:rPr lang="es-ES" dirty="0"/>
-              <a:t>Modificación de los datos</a:t>
-            </a:r>
-          </a:p>
-        </p:txBody>
-      </p:sp>
-      <p:pic>
-        <p:nvPicPr>
-          <p:cNvPr id="7" name="Imagen 6" descr="Interfaz de usuario gráfica, Texto&#10;&#10;Descripción generada automáticamente">
-            <a:extLst>
-              <a:ext uri="{FF2B5EF4-FFF2-40B4-BE49-F238E27FC236}">
-                <a16:creationId xmlns:a16="http://schemas.microsoft.com/office/drawing/2014/main" id="{E50C4518-1A2A-4D61-BADC-D6E94BEDF49A}"/>
-              </a:ext>
-            </a:extLst>
-          </p:cNvPr>
-          <p:cNvPicPr>
-            <a:picLocks noChangeAspect="1"/>
-          </p:cNvPicPr>
-          <p:nvPr/>
-        </p:nvPicPr>
-        <p:blipFill>
-          <a:blip r:embed="rId2">
-            <a:extLst>
-              <a:ext uri="{28A0092B-C50C-407E-A947-70E740481C1C}">
-                <a14:useLocalDpi xmlns:a14="http://schemas.microsoft.com/office/drawing/2010/main" val="0"/>
-              </a:ext>
-            </a:extLst>
-          </a:blip>
-          <a:stretch>
-            <a:fillRect/>
-          </a:stretch>
-        </p:blipFill>
-        <p:spPr>
-          <a:xfrm>
-            <a:off x="670529" y="2148987"/>
-            <a:ext cx="10159311" cy="1553217"/>
-          </a:xfrm>
-          <a:prstGeom prst="rect">
-            <a:avLst/>
-          </a:prstGeom>
-        </p:spPr>
-      </p:pic>
-    </p:spTree>
-    <p:extLst>
-      <p:ext uri="{BB962C8B-B14F-4D97-AF65-F5344CB8AC3E}">
-        <p14:creationId xmlns:p14="http://schemas.microsoft.com/office/powerpoint/2010/main" val="2547857900"/>
       </p:ext>
     </p:extLst>
   </p:cSld>

</xml_diff>